<commit_message>
Added individual slides for all
</commit_message>
<xml_diff>
--- a/Documents/Group_Presentation.pptx
+++ b/Documents/Group_Presentation.pptx
@@ -9,11 +9,18 @@
     <p:sldId id="257" r:id="rId3"/>
     <p:sldId id="258" r:id="rId4"/>
     <p:sldId id="259" r:id="rId5"/>
-    <p:sldId id="260" r:id="rId6"/>
-    <p:sldId id="261" r:id="rId7"/>
-    <p:sldId id="262" r:id="rId8"/>
-    <p:sldId id="263" r:id="rId9"/>
-    <p:sldId id="264" r:id="rId10"/>
+    <p:sldId id="263" r:id="rId6"/>
+    <p:sldId id="267" r:id="rId7"/>
+    <p:sldId id="268" r:id="rId8"/>
+    <p:sldId id="265" r:id="rId9"/>
+    <p:sldId id="269" r:id="rId10"/>
+    <p:sldId id="270" r:id="rId11"/>
+    <p:sldId id="271" r:id="rId12"/>
+    <p:sldId id="272" r:id="rId13"/>
+    <p:sldId id="273" r:id="rId14"/>
+    <p:sldId id="274" r:id="rId15"/>
+    <p:sldId id="264" r:id="rId16"/>
+    <p:sldId id="266" r:id="rId17"/>
   </p:sldIdLst>
   <p:sldSz cx="12192000" cy="6858000"/>
   <p:notesSz cx="6858000" cy="9144000"/>
@@ -120,921 +127,6 @@
 </p:presentation>
 </file>
 
-<file path=ppt/charts/chart1.xml><?xml version="1.0" encoding="utf-8"?>
-<c:chartSpace xmlns:c="http://schemas.openxmlformats.org/drawingml/2006/chart" xmlns:a="http://schemas.openxmlformats.org/drawingml/2006/main" xmlns:r="http://schemas.openxmlformats.org/officeDocument/2006/relationships" xmlns:c16r2="http://schemas.microsoft.com/office/drawing/2015/06/chart">
-  <c:date1904 val="0"/>
-  <c:lang val="en-US"/>
-  <c:roundedCorners val="0"/>
-  <mc:AlternateContent xmlns:mc="http://schemas.openxmlformats.org/markup-compatibility/2006">
-    <mc:Choice xmlns:c14="http://schemas.microsoft.com/office/drawing/2007/8/2/chart" Requires="c14">
-      <c14:style val="102"/>
-    </mc:Choice>
-    <mc:Fallback>
-      <c:style val="2"/>
-    </mc:Fallback>
-  </mc:AlternateContent>
-  <c:chart>
-    <c:title>
-      <c:overlay val="0"/>
-      <c:spPr>
-        <a:noFill/>
-        <a:ln>
-          <a:noFill/>
-        </a:ln>
-        <a:effectLst/>
-      </c:spPr>
-      <c:txPr>
-        <a:bodyPr rot="0" spcFirstLastPara="1" vertOverflow="ellipsis" vert="horz" wrap="square" anchor="ctr" anchorCtr="1"/>
-        <a:lstStyle/>
-        <a:p>
-          <a:pPr>
-            <a:defRPr sz="1400" b="0" i="0" u="none" strike="noStrike" kern="1200" spc="0" baseline="0">
-              <a:solidFill>
-                <a:schemeClr val="tx1">
-                  <a:lumMod val="65000"/>
-                  <a:lumOff val="35000"/>
-                </a:schemeClr>
-              </a:solidFill>
-              <a:latin typeface="+mn-lt"/>
-              <a:ea typeface="+mn-ea"/>
-              <a:cs typeface="+mn-cs"/>
-            </a:defRPr>
-          </a:pPr>
-          <a:endParaRPr lang="en-US"/>
-        </a:p>
-      </c:txPr>
-    </c:title>
-    <c:autoTitleDeleted val="0"/>
-    <c:plotArea>
-      <c:layout/>
-      <c:barChart>
-        <c:barDir val="col"/>
-        <c:grouping val="clustered"/>
-        <c:varyColors val="0"/>
-        <c:ser>
-          <c:idx val="0"/>
-          <c:order val="0"/>
-          <c:tx>
-            <c:strRef>
-              <c:f>Sheet1!$C$2</c:f>
-              <c:strCache>
-                <c:ptCount val="1"/>
-                <c:pt idx="0">
-                  <c:v>Number of Requirements</c:v>
-                </c:pt>
-              </c:strCache>
-            </c:strRef>
-          </c:tx>
-          <c:spPr>
-            <a:solidFill>
-              <a:schemeClr val="accent1"/>
-            </a:solidFill>
-            <a:ln>
-              <a:noFill/>
-            </a:ln>
-            <a:effectLst/>
-          </c:spPr>
-          <c:invertIfNegative val="0"/>
-          <c:dLbls>
-            <c:dLbl>
-              <c:idx val="0"/>
-              <c:showLegendKey val="0"/>
-              <c:showVal val="1"/>
-              <c:showCatName val="0"/>
-              <c:showSerName val="0"/>
-              <c:showPercent val="0"/>
-              <c:showBubbleSize val="0"/>
-              <c:extLst>
-                <c:ext xmlns:c15="http://schemas.microsoft.com/office/drawing/2012/chart" uri="{CE6537A1-D6FC-4f65-9D91-7224C49458BB}"/>
-                <c:ext xmlns:c16="http://schemas.microsoft.com/office/drawing/2014/chart" uri="{C3380CC4-5D6E-409C-BE32-E72D297353CC}">
-                  <c16:uniqueId val="{00000000-9246-EA45-A85A-9980CA4D8A46}"/>
-                </c:ext>
-              </c:extLst>
-            </c:dLbl>
-            <c:dLbl>
-              <c:idx val="1"/>
-              <c:showLegendKey val="0"/>
-              <c:showVal val="1"/>
-              <c:showCatName val="0"/>
-              <c:showSerName val="0"/>
-              <c:showPercent val="0"/>
-              <c:showBubbleSize val="0"/>
-              <c:extLst>
-                <c:ext xmlns:c15="http://schemas.microsoft.com/office/drawing/2012/chart" uri="{CE6537A1-D6FC-4f65-9D91-7224C49458BB}"/>
-                <c:ext xmlns:c16="http://schemas.microsoft.com/office/drawing/2014/chart" uri="{C3380CC4-5D6E-409C-BE32-E72D297353CC}">
-                  <c16:uniqueId val="{00000001-9246-EA45-A85A-9980CA4D8A46}"/>
-                </c:ext>
-              </c:extLst>
-            </c:dLbl>
-            <c:dLbl>
-              <c:idx val="2"/>
-              <c:showLegendKey val="0"/>
-              <c:showVal val="1"/>
-              <c:showCatName val="0"/>
-              <c:showSerName val="0"/>
-              <c:showPercent val="0"/>
-              <c:showBubbleSize val="0"/>
-              <c:extLst>
-                <c:ext xmlns:c15="http://schemas.microsoft.com/office/drawing/2012/chart" uri="{CE6537A1-D6FC-4f65-9D91-7224C49458BB}"/>
-                <c:ext xmlns:c16="http://schemas.microsoft.com/office/drawing/2014/chart" uri="{C3380CC4-5D6E-409C-BE32-E72D297353CC}">
-                  <c16:uniqueId val="{00000002-9246-EA45-A85A-9980CA4D8A46}"/>
-                </c:ext>
-              </c:extLst>
-            </c:dLbl>
-            <c:spPr>
-              <a:noFill/>
-              <a:ln>
-                <a:noFill/>
-              </a:ln>
-              <a:effectLst/>
-            </c:spPr>
-            <c:txPr>
-              <a:bodyPr rot="0" spcFirstLastPara="1" vertOverflow="ellipsis" vert="horz" wrap="square" lIns="38100" tIns="19050" rIns="38100" bIns="19050" anchor="ctr" anchorCtr="1">
-                <a:spAutoFit/>
-              </a:bodyPr>
-              <a:lstStyle/>
-              <a:p>
-                <a:pPr>
-                  <a:defRPr sz="900" b="0" i="0" u="none" strike="noStrike" kern="1200" baseline="0">
-                    <a:solidFill>
-                      <a:schemeClr val="tx1">
-                        <a:lumMod val="75000"/>
-                        <a:lumOff val="25000"/>
-                      </a:schemeClr>
-                    </a:solidFill>
-                    <a:latin typeface="+mn-lt"/>
-                    <a:ea typeface="+mn-ea"/>
-                    <a:cs typeface="+mn-cs"/>
-                  </a:defRPr>
-                </a:pPr>
-                <a:endParaRPr lang="en-US"/>
-              </a:p>
-            </c:txPr>
-            <c:showLegendKey val="0"/>
-            <c:showVal val="0"/>
-            <c:showCatName val="0"/>
-            <c:showSerName val="0"/>
-            <c:showPercent val="0"/>
-            <c:showBubbleSize val="0"/>
-            <c:extLst>
-              <c:ext xmlns:c15="http://schemas.microsoft.com/office/drawing/2012/chart" uri="{CE6537A1-D6FC-4f65-9D91-7224C49458BB}">
-                <c15:showLeaderLines val="1"/>
-                <c15:leaderLines>
-                  <c:spPr>
-                    <a:ln w="9525" cap="flat" cmpd="sng" algn="ctr">
-                      <a:solidFill>
-                        <a:schemeClr val="tx1">
-                          <a:lumMod val="35000"/>
-                          <a:lumOff val="65000"/>
-                        </a:schemeClr>
-                      </a:solidFill>
-                      <a:round/>
-                    </a:ln>
-                    <a:effectLst/>
-                  </c:spPr>
-                </c15:leaderLines>
-              </c:ext>
-            </c:extLst>
-          </c:dLbls>
-          <c:cat>
-            <c:strRef>
-              <c:f>Sheet1!$B$3:$B$5</c:f>
-              <c:strCache>
-                <c:ptCount val="3"/>
-                <c:pt idx="0">
-                  <c:v>Requirements</c:v>
-                </c:pt>
-                <c:pt idx="1">
-                  <c:v>Implementation</c:v>
-                </c:pt>
-                <c:pt idx="2">
-                  <c:v>Testing</c:v>
-                </c:pt>
-              </c:strCache>
-            </c:strRef>
-          </c:cat>
-          <c:val>
-            <c:numRef>
-              <c:f>Sheet1!$C$3:$C$5</c:f>
-              <c:numCache>
-                <c:formatCode>General</c:formatCode>
-                <c:ptCount val="3"/>
-                <c:pt idx="0">
-                  <c:v>25</c:v>
-                </c:pt>
-                <c:pt idx="1">
-                  <c:v>31</c:v>
-                </c:pt>
-                <c:pt idx="2">
-                  <c:v>30</c:v>
-                </c:pt>
-              </c:numCache>
-            </c:numRef>
-          </c:val>
-          <c:extLst>
-            <c:ext xmlns:c16="http://schemas.microsoft.com/office/drawing/2014/chart" uri="{C3380CC4-5D6E-409C-BE32-E72D297353CC}">
-              <c16:uniqueId val="{00000003-9246-EA45-A85A-9980CA4D8A46}"/>
-            </c:ext>
-          </c:extLst>
-        </c:ser>
-        <c:dLbls>
-          <c:showLegendKey val="0"/>
-          <c:showVal val="0"/>
-          <c:showCatName val="0"/>
-          <c:showSerName val="0"/>
-          <c:showPercent val="0"/>
-          <c:showBubbleSize val="0"/>
-        </c:dLbls>
-        <c:gapWidth val="219"/>
-        <c:overlap val="-27"/>
-        <c:axId val="904245824"/>
-        <c:axId val="995372128"/>
-      </c:barChart>
-      <c:catAx>
-        <c:axId val="904245824"/>
-        <c:scaling>
-          <c:orientation val="minMax"/>
-        </c:scaling>
-        <c:delete val="0"/>
-        <c:axPos val="b"/>
-        <c:numFmt formatCode="General" sourceLinked="1"/>
-        <c:majorTickMark val="none"/>
-        <c:minorTickMark val="none"/>
-        <c:tickLblPos val="nextTo"/>
-        <c:spPr>
-          <a:noFill/>
-          <a:ln w="9525" cap="flat" cmpd="sng" algn="ctr">
-            <a:solidFill>
-              <a:schemeClr val="tx1">
-                <a:lumMod val="15000"/>
-                <a:lumOff val="85000"/>
-              </a:schemeClr>
-            </a:solidFill>
-            <a:round/>
-          </a:ln>
-          <a:effectLst/>
-        </c:spPr>
-        <c:txPr>
-          <a:bodyPr rot="-60000000" spcFirstLastPara="1" vertOverflow="ellipsis" vert="horz" wrap="square" anchor="ctr" anchorCtr="1"/>
-          <a:lstStyle/>
-          <a:p>
-            <a:pPr>
-              <a:defRPr sz="900" b="0" i="0" u="none" strike="noStrike" kern="1200" baseline="0">
-                <a:solidFill>
-                  <a:schemeClr val="tx1">
-                    <a:lumMod val="65000"/>
-                    <a:lumOff val="35000"/>
-                  </a:schemeClr>
-                </a:solidFill>
-                <a:latin typeface="+mn-lt"/>
-                <a:ea typeface="+mn-ea"/>
-                <a:cs typeface="+mn-cs"/>
-              </a:defRPr>
-            </a:pPr>
-            <a:endParaRPr lang="en-US"/>
-          </a:p>
-        </c:txPr>
-        <c:crossAx val="995372128"/>
-        <c:crosses val="autoZero"/>
-        <c:auto val="1"/>
-        <c:lblAlgn val="ctr"/>
-        <c:lblOffset val="100"/>
-        <c:noMultiLvlLbl val="0"/>
-      </c:catAx>
-      <c:valAx>
-        <c:axId val="995372128"/>
-        <c:scaling>
-          <c:orientation val="minMax"/>
-        </c:scaling>
-        <c:delete val="0"/>
-        <c:axPos val="l"/>
-        <c:majorGridlines>
-          <c:spPr>
-            <a:ln w="9525" cap="flat" cmpd="sng" algn="ctr">
-              <a:solidFill>
-                <a:schemeClr val="tx1">
-                  <a:lumMod val="15000"/>
-                  <a:lumOff val="85000"/>
-                </a:schemeClr>
-              </a:solidFill>
-              <a:round/>
-            </a:ln>
-            <a:effectLst/>
-          </c:spPr>
-        </c:majorGridlines>
-        <c:numFmt formatCode="General" sourceLinked="1"/>
-        <c:majorTickMark val="none"/>
-        <c:minorTickMark val="none"/>
-        <c:tickLblPos val="nextTo"/>
-        <c:spPr>
-          <a:noFill/>
-          <a:ln>
-            <a:noFill/>
-          </a:ln>
-          <a:effectLst/>
-        </c:spPr>
-        <c:txPr>
-          <a:bodyPr rot="-60000000" spcFirstLastPara="1" vertOverflow="ellipsis" vert="horz" wrap="square" anchor="ctr" anchorCtr="1"/>
-          <a:lstStyle/>
-          <a:p>
-            <a:pPr>
-              <a:defRPr sz="900" b="0" i="0" u="none" strike="noStrike" kern="1200" baseline="0">
-                <a:solidFill>
-                  <a:schemeClr val="tx1">
-                    <a:lumMod val="65000"/>
-                    <a:lumOff val="35000"/>
-                  </a:schemeClr>
-                </a:solidFill>
-                <a:latin typeface="+mn-lt"/>
-                <a:ea typeface="+mn-ea"/>
-                <a:cs typeface="+mn-cs"/>
-              </a:defRPr>
-            </a:pPr>
-            <a:endParaRPr lang="en-US"/>
-          </a:p>
-        </c:txPr>
-        <c:crossAx val="904245824"/>
-        <c:crosses val="autoZero"/>
-        <c:crossBetween val="between"/>
-      </c:valAx>
-      <c:spPr>
-        <a:noFill/>
-        <a:ln>
-          <a:noFill/>
-        </a:ln>
-        <a:effectLst/>
-      </c:spPr>
-    </c:plotArea>
-    <c:plotVisOnly val="1"/>
-    <c:dispBlanksAs val="gap"/>
-    <c:showDLblsOverMax val="0"/>
-  </c:chart>
-  <c:spPr>
-    <a:noFill/>
-    <a:ln>
-      <a:noFill/>
-    </a:ln>
-    <a:effectLst/>
-  </c:spPr>
-  <c:txPr>
-    <a:bodyPr/>
-    <a:lstStyle/>
-    <a:p>
-      <a:pPr>
-        <a:defRPr/>
-      </a:pPr>
-      <a:endParaRPr lang="en-US"/>
-    </a:p>
-  </c:txPr>
-  <c:externalData r:id="rId3">
-    <c:autoUpdate val="0"/>
-  </c:externalData>
-</c:chartSpace>
-</file>
-
-<file path=ppt/charts/colors1.xml><?xml version="1.0" encoding="utf-8"?>
-<cs:colorStyle xmlns:cs="http://schemas.microsoft.com/office/drawing/2012/chartStyle" xmlns:a="http://schemas.openxmlformats.org/drawingml/2006/main" meth="cycle" id="10">
-  <a:schemeClr val="accent1"/>
-  <a:schemeClr val="accent2"/>
-  <a:schemeClr val="accent3"/>
-  <a:schemeClr val="accent4"/>
-  <a:schemeClr val="accent5"/>
-  <a:schemeClr val="accent6"/>
-  <cs:variation/>
-  <cs:variation>
-    <a:lumMod val="60000"/>
-  </cs:variation>
-  <cs:variation>
-    <a:lumMod val="80000"/>
-    <a:lumOff val="20000"/>
-  </cs:variation>
-  <cs:variation>
-    <a:lumMod val="80000"/>
-  </cs:variation>
-  <cs:variation>
-    <a:lumMod val="60000"/>
-    <a:lumOff val="40000"/>
-  </cs:variation>
-  <cs:variation>
-    <a:lumMod val="50000"/>
-  </cs:variation>
-  <cs:variation>
-    <a:lumMod val="70000"/>
-    <a:lumOff val="30000"/>
-  </cs:variation>
-  <cs:variation>
-    <a:lumMod val="70000"/>
-  </cs:variation>
-  <cs:variation>
-    <a:lumMod val="50000"/>
-    <a:lumOff val="50000"/>
-  </cs:variation>
-</cs:colorStyle>
-</file>
-
-<file path=ppt/charts/style1.xml><?xml version="1.0" encoding="utf-8"?>
-<cs:chartStyle xmlns:cs="http://schemas.microsoft.com/office/drawing/2012/chartStyle" xmlns:a="http://schemas.openxmlformats.org/drawingml/2006/main" id="201">
-  <cs:axisTitle>
-    <cs:lnRef idx="0"/>
-    <cs:fillRef idx="0"/>
-    <cs:effectRef idx="0"/>
-    <cs:fontRef idx="minor">
-      <a:schemeClr val="tx1">
-        <a:lumMod val="65000"/>
-        <a:lumOff val="35000"/>
-      </a:schemeClr>
-    </cs:fontRef>
-    <cs:defRPr sz="1000" kern="1200"/>
-  </cs:axisTitle>
-  <cs:categoryAxis>
-    <cs:lnRef idx="0"/>
-    <cs:fillRef idx="0"/>
-    <cs:effectRef idx="0"/>
-    <cs:fontRef idx="minor">
-      <a:schemeClr val="tx1">
-        <a:lumMod val="65000"/>
-        <a:lumOff val="35000"/>
-      </a:schemeClr>
-    </cs:fontRef>
-    <cs:spPr>
-      <a:ln w="9525" cap="flat" cmpd="sng" algn="ctr">
-        <a:solidFill>
-          <a:schemeClr val="tx1">
-            <a:lumMod val="15000"/>
-            <a:lumOff val="85000"/>
-          </a:schemeClr>
-        </a:solidFill>
-        <a:round/>
-      </a:ln>
-    </cs:spPr>
-    <cs:defRPr sz="900" kern="1200"/>
-  </cs:categoryAxis>
-  <cs:chartArea mods="allowNoFillOverride allowNoLineOverride">
-    <cs:lnRef idx="0"/>
-    <cs:fillRef idx="0"/>
-    <cs:effectRef idx="0"/>
-    <cs:fontRef idx="minor">
-      <a:schemeClr val="tx1"/>
-    </cs:fontRef>
-    <cs:spPr>
-      <a:solidFill>
-        <a:schemeClr val="bg1"/>
-      </a:solidFill>
-      <a:ln w="9525" cap="flat" cmpd="sng" algn="ctr">
-        <a:solidFill>
-          <a:schemeClr val="tx1">
-            <a:lumMod val="15000"/>
-            <a:lumOff val="85000"/>
-          </a:schemeClr>
-        </a:solidFill>
-        <a:round/>
-      </a:ln>
-    </cs:spPr>
-    <cs:defRPr sz="1000" kern="1200"/>
-  </cs:chartArea>
-  <cs:dataLabel>
-    <cs:lnRef idx="0"/>
-    <cs:fillRef idx="0"/>
-    <cs:effectRef idx="0"/>
-    <cs:fontRef idx="minor">
-      <a:schemeClr val="tx1">
-        <a:lumMod val="75000"/>
-        <a:lumOff val="25000"/>
-      </a:schemeClr>
-    </cs:fontRef>
-    <cs:defRPr sz="900" kern="1200"/>
-  </cs:dataLabel>
-  <cs:dataLabelCallout>
-    <cs:lnRef idx="0"/>
-    <cs:fillRef idx="0"/>
-    <cs:effectRef idx="0"/>
-    <cs:fontRef idx="minor">
-      <a:schemeClr val="dk1">
-        <a:lumMod val="65000"/>
-        <a:lumOff val="35000"/>
-      </a:schemeClr>
-    </cs:fontRef>
-    <cs:spPr>
-      <a:solidFill>
-        <a:schemeClr val="lt1"/>
-      </a:solidFill>
-      <a:ln>
-        <a:solidFill>
-          <a:schemeClr val="dk1">
-            <a:lumMod val="25000"/>
-            <a:lumOff val="75000"/>
-          </a:schemeClr>
-        </a:solidFill>
-      </a:ln>
-    </cs:spPr>
-    <cs:defRPr sz="900" kern="1200"/>
-    <cs:bodyPr rot="0" spcFirstLastPara="1" vertOverflow="clip" horzOverflow="clip" vert="horz" wrap="square" lIns="36576" tIns="18288" rIns="36576" bIns="18288" anchor="ctr" anchorCtr="1">
-      <a:spAutoFit/>
-    </cs:bodyPr>
-  </cs:dataLabelCallout>
-  <cs:dataPoint>
-    <cs:lnRef idx="0"/>
-    <cs:fillRef idx="1">
-      <cs:styleClr val="auto"/>
-    </cs:fillRef>
-    <cs:effectRef idx="0"/>
-    <cs:fontRef idx="minor">
-      <a:schemeClr val="tx1"/>
-    </cs:fontRef>
-  </cs:dataPoint>
-  <cs:dataPoint3D>
-    <cs:lnRef idx="0"/>
-    <cs:fillRef idx="1">
-      <cs:styleClr val="auto"/>
-    </cs:fillRef>
-    <cs:effectRef idx="0"/>
-    <cs:fontRef idx="minor">
-      <a:schemeClr val="tx1"/>
-    </cs:fontRef>
-  </cs:dataPoint3D>
-  <cs:dataPointLine>
-    <cs:lnRef idx="0">
-      <cs:styleClr val="auto"/>
-    </cs:lnRef>
-    <cs:fillRef idx="1"/>
-    <cs:effectRef idx="0"/>
-    <cs:fontRef idx="minor">
-      <a:schemeClr val="tx1"/>
-    </cs:fontRef>
-    <cs:spPr>
-      <a:ln w="28575" cap="rnd">
-        <a:solidFill>
-          <a:schemeClr val="phClr"/>
-        </a:solidFill>
-        <a:round/>
-      </a:ln>
-    </cs:spPr>
-  </cs:dataPointLine>
-  <cs:dataPointMarker>
-    <cs:lnRef idx="0">
-      <cs:styleClr val="auto"/>
-    </cs:lnRef>
-    <cs:fillRef idx="1">
-      <cs:styleClr val="auto"/>
-    </cs:fillRef>
-    <cs:effectRef idx="0"/>
-    <cs:fontRef idx="minor">
-      <a:schemeClr val="tx1"/>
-    </cs:fontRef>
-    <cs:spPr>
-      <a:ln w="9525">
-        <a:solidFill>
-          <a:schemeClr val="phClr"/>
-        </a:solidFill>
-      </a:ln>
-    </cs:spPr>
-  </cs:dataPointMarker>
-  <cs:dataPointMarkerLayout symbol="circle" size="5"/>
-  <cs:dataPointWireframe>
-    <cs:lnRef idx="0">
-      <cs:styleClr val="auto"/>
-    </cs:lnRef>
-    <cs:fillRef idx="1"/>
-    <cs:effectRef idx="0"/>
-    <cs:fontRef idx="minor">
-      <a:schemeClr val="tx1"/>
-    </cs:fontRef>
-    <cs:spPr>
-      <a:ln w="9525" cap="rnd">
-        <a:solidFill>
-          <a:schemeClr val="phClr"/>
-        </a:solidFill>
-        <a:round/>
-      </a:ln>
-    </cs:spPr>
-  </cs:dataPointWireframe>
-  <cs:dataTable>
-    <cs:lnRef idx="0"/>
-    <cs:fillRef idx="0"/>
-    <cs:effectRef idx="0"/>
-    <cs:fontRef idx="minor">
-      <a:schemeClr val="tx1">
-        <a:lumMod val="65000"/>
-        <a:lumOff val="35000"/>
-      </a:schemeClr>
-    </cs:fontRef>
-    <cs:spPr>
-      <a:noFill/>
-      <a:ln w="9525" cap="flat" cmpd="sng" algn="ctr">
-        <a:solidFill>
-          <a:schemeClr val="tx1">
-            <a:lumMod val="15000"/>
-            <a:lumOff val="85000"/>
-          </a:schemeClr>
-        </a:solidFill>
-        <a:round/>
-      </a:ln>
-    </cs:spPr>
-    <cs:defRPr sz="900" kern="1200"/>
-  </cs:dataTable>
-  <cs:downBar>
-    <cs:lnRef idx="0"/>
-    <cs:fillRef idx="0"/>
-    <cs:effectRef idx="0"/>
-    <cs:fontRef idx="minor">
-      <a:schemeClr val="dk1"/>
-    </cs:fontRef>
-    <cs:spPr>
-      <a:solidFill>
-        <a:schemeClr val="dk1">
-          <a:lumMod val="65000"/>
-          <a:lumOff val="35000"/>
-        </a:schemeClr>
-      </a:solidFill>
-      <a:ln w="9525">
-        <a:solidFill>
-          <a:schemeClr val="tx1">
-            <a:lumMod val="65000"/>
-            <a:lumOff val="35000"/>
-          </a:schemeClr>
-        </a:solidFill>
-      </a:ln>
-    </cs:spPr>
-  </cs:downBar>
-  <cs:dropLine>
-    <cs:lnRef idx="0"/>
-    <cs:fillRef idx="0"/>
-    <cs:effectRef idx="0"/>
-    <cs:fontRef idx="minor">
-      <a:schemeClr val="tx1"/>
-    </cs:fontRef>
-    <cs:spPr>
-      <a:ln w="9525" cap="flat" cmpd="sng" algn="ctr">
-        <a:solidFill>
-          <a:schemeClr val="tx1">
-            <a:lumMod val="35000"/>
-            <a:lumOff val="65000"/>
-          </a:schemeClr>
-        </a:solidFill>
-        <a:round/>
-      </a:ln>
-    </cs:spPr>
-  </cs:dropLine>
-  <cs:errorBar>
-    <cs:lnRef idx="0"/>
-    <cs:fillRef idx="0"/>
-    <cs:effectRef idx="0"/>
-    <cs:fontRef idx="minor">
-      <a:schemeClr val="tx1"/>
-    </cs:fontRef>
-    <cs:spPr>
-      <a:ln w="9525" cap="flat" cmpd="sng" algn="ctr">
-        <a:solidFill>
-          <a:schemeClr val="tx1">
-            <a:lumMod val="65000"/>
-            <a:lumOff val="35000"/>
-          </a:schemeClr>
-        </a:solidFill>
-        <a:round/>
-      </a:ln>
-    </cs:spPr>
-  </cs:errorBar>
-  <cs:floor>
-    <cs:lnRef idx="0"/>
-    <cs:fillRef idx="0"/>
-    <cs:effectRef idx="0"/>
-    <cs:fontRef idx="minor">
-      <a:schemeClr val="tx1"/>
-    </cs:fontRef>
-    <cs:spPr>
-      <a:noFill/>
-      <a:ln>
-        <a:noFill/>
-      </a:ln>
-    </cs:spPr>
-  </cs:floor>
-  <cs:gridlineMajor>
-    <cs:lnRef idx="0"/>
-    <cs:fillRef idx="0"/>
-    <cs:effectRef idx="0"/>
-    <cs:fontRef idx="minor">
-      <a:schemeClr val="tx1"/>
-    </cs:fontRef>
-    <cs:spPr>
-      <a:ln w="9525" cap="flat" cmpd="sng" algn="ctr">
-        <a:solidFill>
-          <a:schemeClr val="tx1">
-            <a:lumMod val="15000"/>
-            <a:lumOff val="85000"/>
-          </a:schemeClr>
-        </a:solidFill>
-        <a:round/>
-      </a:ln>
-    </cs:spPr>
-  </cs:gridlineMajor>
-  <cs:gridlineMinor>
-    <cs:lnRef idx="0"/>
-    <cs:fillRef idx="0"/>
-    <cs:effectRef idx="0"/>
-    <cs:fontRef idx="minor">
-      <a:schemeClr val="tx1"/>
-    </cs:fontRef>
-    <cs:spPr>
-      <a:ln w="9525" cap="flat" cmpd="sng" algn="ctr">
-        <a:solidFill>
-          <a:schemeClr val="tx1">
-            <a:lumMod val="5000"/>
-            <a:lumOff val="95000"/>
-          </a:schemeClr>
-        </a:solidFill>
-        <a:round/>
-      </a:ln>
-    </cs:spPr>
-  </cs:gridlineMinor>
-  <cs:hiLoLine>
-    <cs:lnRef idx="0"/>
-    <cs:fillRef idx="0"/>
-    <cs:effectRef idx="0"/>
-    <cs:fontRef idx="minor">
-      <a:schemeClr val="tx1"/>
-    </cs:fontRef>
-    <cs:spPr>
-      <a:ln w="9525" cap="flat" cmpd="sng" algn="ctr">
-        <a:solidFill>
-          <a:schemeClr val="tx1">
-            <a:lumMod val="75000"/>
-            <a:lumOff val="25000"/>
-          </a:schemeClr>
-        </a:solidFill>
-        <a:round/>
-      </a:ln>
-    </cs:spPr>
-  </cs:hiLoLine>
-  <cs:leaderLine>
-    <cs:lnRef idx="0"/>
-    <cs:fillRef idx="0"/>
-    <cs:effectRef idx="0"/>
-    <cs:fontRef idx="minor">
-      <a:schemeClr val="tx1"/>
-    </cs:fontRef>
-    <cs:spPr>
-      <a:ln w="9525" cap="flat" cmpd="sng" algn="ctr">
-        <a:solidFill>
-          <a:schemeClr val="tx1">
-            <a:lumMod val="35000"/>
-            <a:lumOff val="65000"/>
-          </a:schemeClr>
-        </a:solidFill>
-        <a:round/>
-      </a:ln>
-    </cs:spPr>
-  </cs:leaderLine>
-  <cs:legend>
-    <cs:lnRef idx="0"/>
-    <cs:fillRef idx="0"/>
-    <cs:effectRef idx="0"/>
-    <cs:fontRef idx="minor">
-      <a:schemeClr val="tx1">
-        <a:lumMod val="65000"/>
-        <a:lumOff val="35000"/>
-      </a:schemeClr>
-    </cs:fontRef>
-    <cs:defRPr sz="900" kern="1200"/>
-  </cs:legend>
-  <cs:plotArea mods="allowNoFillOverride allowNoLineOverride">
-    <cs:lnRef idx="0"/>
-    <cs:fillRef idx="0"/>
-    <cs:effectRef idx="0"/>
-    <cs:fontRef idx="minor">
-      <a:schemeClr val="tx1"/>
-    </cs:fontRef>
-  </cs:plotArea>
-  <cs:plotArea3D mods="allowNoFillOverride allowNoLineOverride">
-    <cs:lnRef idx="0"/>
-    <cs:fillRef idx="0"/>
-    <cs:effectRef idx="0"/>
-    <cs:fontRef idx="minor">
-      <a:schemeClr val="tx1"/>
-    </cs:fontRef>
-  </cs:plotArea3D>
-  <cs:seriesAxis>
-    <cs:lnRef idx="0"/>
-    <cs:fillRef idx="0"/>
-    <cs:effectRef idx="0"/>
-    <cs:fontRef idx="minor">
-      <a:schemeClr val="tx1">
-        <a:lumMod val="65000"/>
-        <a:lumOff val="35000"/>
-      </a:schemeClr>
-    </cs:fontRef>
-    <cs:defRPr sz="900" kern="1200"/>
-  </cs:seriesAxis>
-  <cs:seriesLine>
-    <cs:lnRef idx="0"/>
-    <cs:fillRef idx="0"/>
-    <cs:effectRef idx="0"/>
-    <cs:fontRef idx="minor">
-      <a:schemeClr val="tx1"/>
-    </cs:fontRef>
-    <cs:spPr>
-      <a:ln w="9525" cap="flat" cmpd="sng" algn="ctr">
-        <a:solidFill>
-          <a:schemeClr val="tx1">
-            <a:lumMod val="35000"/>
-            <a:lumOff val="65000"/>
-          </a:schemeClr>
-        </a:solidFill>
-        <a:round/>
-      </a:ln>
-    </cs:spPr>
-  </cs:seriesLine>
-  <cs:title>
-    <cs:lnRef idx="0"/>
-    <cs:fillRef idx="0"/>
-    <cs:effectRef idx="0"/>
-    <cs:fontRef idx="minor">
-      <a:schemeClr val="tx1">
-        <a:lumMod val="65000"/>
-        <a:lumOff val="35000"/>
-      </a:schemeClr>
-    </cs:fontRef>
-    <cs:defRPr sz="1400" b="0" kern="1200" spc="0" baseline="0"/>
-  </cs:title>
-  <cs:trendline>
-    <cs:lnRef idx="0">
-      <cs:styleClr val="auto"/>
-    </cs:lnRef>
-    <cs:fillRef idx="0"/>
-    <cs:effectRef idx="0"/>
-    <cs:fontRef idx="minor">
-      <a:schemeClr val="tx1"/>
-    </cs:fontRef>
-    <cs:spPr>
-      <a:ln w="19050" cap="rnd">
-        <a:solidFill>
-          <a:schemeClr val="phClr"/>
-        </a:solidFill>
-        <a:prstDash val="sysDot"/>
-      </a:ln>
-    </cs:spPr>
-  </cs:trendline>
-  <cs:trendlineLabel>
-    <cs:lnRef idx="0"/>
-    <cs:fillRef idx="0"/>
-    <cs:effectRef idx="0"/>
-    <cs:fontRef idx="minor">
-      <a:schemeClr val="tx1">
-        <a:lumMod val="65000"/>
-        <a:lumOff val="35000"/>
-      </a:schemeClr>
-    </cs:fontRef>
-    <cs:defRPr sz="900" kern="1200"/>
-  </cs:trendlineLabel>
-  <cs:upBar>
-    <cs:lnRef idx="0"/>
-    <cs:fillRef idx="0"/>
-    <cs:effectRef idx="0"/>
-    <cs:fontRef idx="minor">
-      <a:schemeClr val="dk1"/>
-    </cs:fontRef>
-    <cs:spPr>
-      <a:solidFill>
-        <a:schemeClr val="lt1"/>
-      </a:solidFill>
-      <a:ln w="9525">
-        <a:solidFill>
-          <a:schemeClr val="tx1">
-            <a:lumMod val="15000"/>
-            <a:lumOff val="85000"/>
-          </a:schemeClr>
-        </a:solidFill>
-      </a:ln>
-    </cs:spPr>
-  </cs:upBar>
-  <cs:valueAxis>
-    <cs:lnRef idx="0"/>
-    <cs:fillRef idx="0"/>
-    <cs:effectRef idx="0"/>
-    <cs:fontRef idx="minor">
-      <a:schemeClr val="tx1">
-        <a:lumMod val="65000"/>
-        <a:lumOff val="35000"/>
-      </a:schemeClr>
-    </cs:fontRef>
-    <cs:defRPr sz="900" kern="1200"/>
-  </cs:valueAxis>
-  <cs:wall>
-    <cs:lnRef idx="0"/>
-    <cs:fillRef idx="0"/>
-    <cs:effectRef idx="0"/>
-    <cs:fontRef idx="minor">
-      <a:schemeClr val="tx1"/>
-    </cs:fontRef>
-    <cs:spPr>
-      <a:noFill/>
-      <a:ln>
-        <a:noFill/>
-      </a:ln>
-    </cs:spPr>
-  </cs:wall>
-</cs:chartStyle>
-</file>
-
 <file path=ppt/slideLayouts/slideLayout1.xml><?xml version="1.0" encoding="utf-8"?>
 <p:sldLayout xmlns:a="http://schemas.openxmlformats.org/drawingml/2006/main" xmlns:r="http://schemas.openxmlformats.org/officeDocument/2006/relationships" xmlns:p="http://schemas.openxmlformats.org/presentationml/2006/main" showMasterSp="0" type="title" preserve="1">
   <p:cSld name="Title Slide">
@@ -1085,7 +177,7 @@
           <a:noFill/>
           <a:extLst>
             <a:ext uri="{909E8E84-426E-40dd-AFC4-6F175D3DCCD1}">
-              <a14:hiddenFill xmlns:a14="http://schemas.microsoft.com/office/drawing/2010/main" xmlns="">
+              <a14:hiddenFill xmlns="" xmlns:a14="http://schemas.microsoft.com/office/drawing/2010/main">
                 <a:solidFill>
                   <a:srgbClr val="FFFFFF"/>
                 </a:solidFill>
@@ -1145,7 +237,7 @@
             </a:ln>
             <a:extLst>
               <a:ext uri="{91240B29-F687-4f45-9708-019B960494DF}">
-                <a14:hiddenLine xmlns:a14="http://schemas.microsoft.com/office/drawing/2010/main" xmlns="" w="9525">
+                <a14:hiddenLine xmlns="" xmlns:a14="http://schemas.microsoft.com/office/drawing/2010/main" w="9525">
                   <a:solidFill>
                     <a:srgbClr val="000000"/>
                   </a:solidFill>
@@ -1235,7 +327,7 @@
             </a:ln>
             <a:extLst>
               <a:ext uri="{91240B29-F687-4f45-9708-019B960494DF}">
-                <a14:hiddenLine xmlns:a14="http://schemas.microsoft.com/office/drawing/2010/main" xmlns="" w="9525">
+                <a14:hiddenLine xmlns="" xmlns:a14="http://schemas.microsoft.com/office/drawing/2010/main" w="9525">
                   <a:solidFill>
                     <a:srgbClr val="000000"/>
                   </a:solidFill>
@@ -1325,7 +417,7 @@
             </a:ln>
             <a:extLst>
               <a:ext uri="{91240B29-F687-4f45-9708-019B960494DF}">
-                <a14:hiddenLine xmlns:a14="http://schemas.microsoft.com/office/drawing/2010/main" xmlns="" w="9525">
+                <a14:hiddenLine xmlns="" xmlns:a14="http://schemas.microsoft.com/office/drawing/2010/main" w="9525">
                   <a:solidFill>
                     <a:srgbClr val="000000"/>
                   </a:solidFill>
@@ -1359,7 +451,7 @@
             </a:ln>
             <a:extLst>
               <a:ext uri="{91240B29-F687-4f45-9708-019B960494DF}">
-                <a14:hiddenLine xmlns:a14="http://schemas.microsoft.com/office/drawing/2010/main" xmlns="" w="9525">
+                <a14:hiddenLine xmlns="" xmlns:a14="http://schemas.microsoft.com/office/drawing/2010/main" w="9525">
                   <a:solidFill>
                     <a:srgbClr val="000000"/>
                   </a:solidFill>
@@ -1449,7 +541,7 @@
             </a:ln>
             <a:extLst>
               <a:ext uri="{91240B29-F687-4f45-9708-019B960494DF}">
-                <a14:hiddenLine xmlns:a14="http://schemas.microsoft.com/office/drawing/2010/main" xmlns="" w="9525">
+                <a14:hiddenLine xmlns="" xmlns:a14="http://schemas.microsoft.com/office/drawing/2010/main" w="9525">
                   <a:solidFill>
                     <a:srgbClr val="000000"/>
                   </a:solidFill>
@@ -1511,7 +603,7 @@
             </a:ln>
             <a:extLst>
               <a:ext uri="{91240B29-F687-4f45-9708-019B960494DF}">
-                <a14:hiddenLine xmlns:a14="http://schemas.microsoft.com/office/drawing/2010/main" xmlns="" w="9525">
+                <a14:hiddenLine xmlns="" xmlns:a14="http://schemas.microsoft.com/office/drawing/2010/main" w="9525">
                   <a:solidFill>
                     <a:srgbClr val="000000"/>
                   </a:solidFill>
@@ -1573,7 +665,7 @@
             </a:ln>
             <a:extLst>
               <a:ext uri="{91240B29-F687-4f45-9708-019B960494DF}">
-                <a14:hiddenLine xmlns:a14="http://schemas.microsoft.com/office/drawing/2010/main" xmlns="" w="9525">
+                <a14:hiddenLine xmlns="" xmlns:a14="http://schemas.microsoft.com/office/drawing/2010/main" w="9525">
                   <a:solidFill>
                     <a:srgbClr val="000000"/>
                   </a:solidFill>
@@ -1663,7 +755,7 @@
             </a:ln>
             <a:extLst>
               <a:ext uri="{91240B29-F687-4f45-9708-019B960494DF}">
-                <a14:hiddenLine xmlns:a14="http://schemas.microsoft.com/office/drawing/2010/main" xmlns="" w="9525">
+                <a14:hiddenLine xmlns="" xmlns:a14="http://schemas.microsoft.com/office/drawing/2010/main" w="9525">
                   <a:solidFill>
                     <a:srgbClr val="000000"/>
                   </a:solidFill>
@@ -1725,7 +817,7 @@
             </a:ln>
             <a:extLst>
               <a:ext uri="{91240B29-F687-4f45-9708-019B960494DF}">
-                <a14:hiddenLine xmlns:a14="http://schemas.microsoft.com/office/drawing/2010/main" xmlns="" w="9525">
+                <a14:hiddenLine xmlns="" xmlns:a14="http://schemas.microsoft.com/office/drawing/2010/main" w="9525">
                   <a:solidFill>
                     <a:srgbClr val="000000"/>
                   </a:solidFill>
@@ -1787,7 +879,7 @@
             </a:ln>
             <a:extLst>
               <a:ext uri="{91240B29-F687-4f45-9708-019B960494DF}">
-                <a14:hiddenLine xmlns:a14="http://schemas.microsoft.com/office/drawing/2010/main" xmlns="" w="9525">
+                <a14:hiddenLine xmlns="" xmlns:a14="http://schemas.microsoft.com/office/drawing/2010/main" w="9525">
                   <a:solidFill>
                     <a:srgbClr val="000000"/>
                   </a:solidFill>
@@ -1877,7 +969,7 @@
             </a:ln>
             <a:extLst>
               <a:ext uri="{91240B29-F687-4f45-9708-019B960494DF}">
-                <a14:hiddenLine xmlns:a14="http://schemas.microsoft.com/office/drawing/2010/main" xmlns="" w="9525">
+                <a14:hiddenLine xmlns="" xmlns:a14="http://schemas.microsoft.com/office/drawing/2010/main" w="9525">
                   <a:solidFill>
                     <a:srgbClr val="000000"/>
                   </a:solidFill>
@@ -1967,7 +1059,7 @@
             </a:ln>
             <a:extLst>
               <a:ext uri="{91240B29-F687-4f45-9708-019B960494DF}">
-                <a14:hiddenLine xmlns:a14="http://schemas.microsoft.com/office/drawing/2010/main" xmlns="" w="9525">
+                <a14:hiddenLine xmlns="" xmlns:a14="http://schemas.microsoft.com/office/drawing/2010/main" w="9525">
                   <a:solidFill>
                     <a:srgbClr val="000000"/>
                   </a:solidFill>
@@ -2029,7 +1121,7 @@
             </a:ln>
             <a:extLst>
               <a:ext uri="{91240B29-F687-4f45-9708-019B960494DF}">
-                <a14:hiddenLine xmlns:a14="http://schemas.microsoft.com/office/drawing/2010/main" xmlns="" w="9525">
+                <a14:hiddenLine xmlns="" xmlns:a14="http://schemas.microsoft.com/office/drawing/2010/main" w="9525">
                   <a:solidFill>
                     <a:srgbClr val="000000"/>
                   </a:solidFill>
@@ -2139,7 +1231,7 @@
             </a:ln>
             <a:extLst>
               <a:ext uri="{91240B29-F687-4f45-9708-019B960494DF}">
-                <a14:hiddenLine xmlns:a14="http://schemas.microsoft.com/office/drawing/2010/main" xmlns="" w="9525">
+                <a14:hiddenLine xmlns="" xmlns:a14="http://schemas.microsoft.com/office/drawing/2010/main" w="9525">
                   <a:solidFill>
                     <a:srgbClr val="000000"/>
                   </a:solidFill>
@@ -2201,7 +1293,7 @@
             </a:ln>
             <a:extLst>
               <a:ext uri="{91240B29-F687-4f45-9708-019B960494DF}">
-                <a14:hiddenLine xmlns:a14="http://schemas.microsoft.com/office/drawing/2010/main" xmlns="" w="9525">
+                <a14:hiddenLine xmlns="" xmlns:a14="http://schemas.microsoft.com/office/drawing/2010/main" w="9525">
                   <a:solidFill>
                     <a:srgbClr val="000000"/>
                   </a:solidFill>
@@ -2291,7 +1383,7 @@
             </a:ln>
             <a:extLst>
               <a:ext uri="{91240B29-F687-4f45-9708-019B960494DF}">
-                <a14:hiddenLine xmlns:a14="http://schemas.microsoft.com/office/drawing/2010/main" xmlns="" w="9525">
+                <a14:hiddenLine xmlns="" xmlns:a14="http://schemas.microsoft.com/office/drawing/2010/main" w="9525">
                   <a:solidFill>
                     <a:srgbClr val="000000"/>
                   </a:solidFill>
@@ -2381,7 +1473,7 @@
             </a:ln>
             <a:extLst>
               <a:ext uri="{91240B29-F687-4f45-9708-019B960494DF}">
-                <a14:hiddenLine xmlns:a14="http://schemas.microsoft.com/office/drawing/2010/main" xmlns="" w="9525">
+                <a14:hiddenLine xmlns="" xmlns:a14="http://schemas.microsoft.com/office/drawing/2010/main" w="9525">
                   <a:solidFill>
                     <a:srgbClr val="000000"/>
                   </a:solidFill>
@@ -2443,7 +1535,7 @@
             </a:ln>
             <a:extLst>
               <a:ext uri="{91240B29-F687-4f45-9708-019B960494DF}">
-                <a14:hiddenLine xmlns:a14="http://schemas.microsoft.com/office/drawing/2010/main" xmlns="" w="9525">
+                <a14:hiddenLine xmlns="" xmlns:a14="http://schemas.microsoft.com/office/drawing/2010/main" w="9525">
                   <a:solidFill>
                     <a:srgbClr val="000000"/>
                   </a:solidFill>
@@ -2533,7 +1625,7 @@
             </a:ln>
             <a:extLst>
               <a:ext uri="{91240B29-F687-4f45-9708-019B960494DF}">
-                <a14:hiddenLine xmlns:a14="http://schemas.microsoft.com/office/drawing/2010/main" xmlns="" w="9525">
+                <a14:hiddenLine xmlns="" xmlns:a14="http://schemas.microsoft.com/office/drawing/2010/main" w="9525">
                   <a:solidFill>
                     <a:srgbClr val="000000"/>
                   </a:solidFill>
@@ -2623,7 +1715,7 @@
             </a:ln>
             <a:extLst>
               <a:ext uri="{91240B29-F687-4f45-9708-019B960494DF}">
-                <a14:hiddenLine xmlns:a14="http://schemas.microsoft.com/office/drawing/2010/main" xmlns="" w="9525">
+                <a14:hiddenLine xmlns="" xmlns:a14="http://schemas.microsoft.com/office/drawing/2010/main" w="9525">
                   <a:solidFill>
                     <a:srgbClr val="000000"/>
                   </a:solidFill>
@@ -2679,7 +1771,7 @@
             </a:ln>
             <a:extLst>
               <a:ext uri="{91240B29-F687-4f45-9708-019B960494DF}">
-                <a14:hiddenLine xmlns:a14="http://schemas.microsoft.com/office/drawing/2010/main" xmlns="" w="9525">
+                <a14:hiddenLine xmlns="" xmlns:a14="http://schemas.microsoft.com/office/drawing/2010/main" w="9525">
                   <a:solidFill>
                     <a:srgbClr val="000000"/>
                   </a:solidFill>
@@ -2769,7 +1861,7 @@
             </a:ln>
             <a:extLst>
               <a:ext uri="{91240B29-F687-4f45-9708-019B960494DF}">
-                <a14:hiddenLine xmlns:a14="http://schemas.microsoft.com/office/drawing/2010/main" xmlns="" w="9525">
+                <a14:hiddenLine xmlns="" xmlns:a14="http://schemas.microsoft.com/office/drawing/2010/main" w="9525">
                   <a:solidFill>
                     <a:srgbClr val="000000"/>
                   </a:solidFill>
@@ -2825,7 +1917,7 @@
             </a:ln>
             <a:extLst>
               <a:ext uri="{91240B29-F687-4f45-9708-019B960494DF}">
-                <a14:hiddenLine xmlns:a14="http://schemas.microsoft.com/office/drawing/2010/main" xmlns="" w="9525">
+                <a14:hiddenLine xmlns="" xmlns:a14="http://schemas.microsoft.com/office/drawing/2010/main" w="9525">
                   <a:solidFill>
                     <a:srgbClr val="000000"/>
                   </a:solidFill>
@@ -2915,7 +2007,7 @@
             </a:ln>
             <a:extLst>
               <a:ext uri="{91240B29-F687-4f45-9708-019B960494DF}">
-                <a14:hiddenLine xmlns:a14="http://schemas.microsoft.com/office/drawing/2010/main" xmlns="" w="9525">
+                <a14:hiddenLine xmlns="" xmlns:a14="http://schemas.microsoft.com/office/drawing/2010/main" w="9525">
                   <a:solidFill>
                     <a:srgbClr val="000000"/>
                   </a:solidFill>
@@ -2983,7 +2075,7 @@
             </a:ln>
             <a:extLst>
               <a:ext uri="{91240B29-F687-4f45-9708-019B960494DF}">
-                <a14:hiddenLine xmlns:a14="http://schemas.microsoft.com/office/drawing/2010/main" xmlns="" w="9525">
+                <a14:hiddenLine xmlns="" xmlns:a14="http://schemas.microsoft.com/office/drawing/2010/main" w="9525">
                   <a:solidFill>
                     <a:srgbClr val="000000"/>
                   </a:solidFill>
@@ -3073,7 +2165,7 @@
             </a:ln>
             <a:extLst>
               <a:ext uri="{91240B29-F687-4f45-9708-019B960494DF}">
-                <a14:hiddenLine xmlns:a14="http://schemas.microsoft.com/office/drawing/2010/main" xmlns="" w="9525">
+                <a14:hiddenLine xmlns="" xmlns:a14="http://schemas.microsoft.com/office/drawing/2010/main" w="9525">
                   <a:solidFill>
                     <a:srgbClr val="000000"/>
                   </a:solidFill>
@@ -3141,7 +2233,7 @@
             </a:ln>
             <a:extLst>
               <a:ext uri="{91240B29-F687-4f45-9708-019B960494DF}">
-                <a14:hiddenLine xmlns:a14="http://schemas.microsoft.com/office/drawing/2010/main" xmlns="" w="9525">
+                <a14:hiddenLine xmlns="" xmlns:a14="http://schemas.microsoft.com/office/drawing/2010/main" w="9525">
                   <a:solidFill>
                     <a:srgbClr val="000000"/>
                   </a:solidFill>
@@ -3231,7 +2323,7 @@
             </a:ln>
             <a:extLst>
               <a:ext uri="{91240B29-F687-4f45-9708-019B960494DF}">
-                <a14:hiddenLine xmlns:a14="http://schemas.microsoft.com/office/drawing/2010/main" xmlns="" w="9525">
+                <a14:hiddenLine xmlns="" xmlns:a14="http://schemas.microsoft.com/office/drawing/2010/main" w="9525">
                   <a:solidFill>
                     <a:srgbClr val="000000"/>
                   </a:solidFill>
@@ -3265,7 +2357,7 @@
             </a:ln>
             <a:extLst>
               <a:ext uri="{91240B29-F687-4f45-9708-019B960494DF}">
-                <a14:hiddenLine xmlns:a14="http://schemas.microsoft.com/office/drawing/2010/main" xmlns="" w="9525">
+                <a14:hiddenLine xmlns="" xmlns:a14="http://schemas.microsoft.com/office/drawing/2010/main" w="9525">
                   <a:solidFill>
                     <a:srgbClr val="000000"/>
                   </a:solidFill>
@@ -3355,7 +2447,7 @@
             </a:ln>
             <a:extLst>
               <a:ext uri="{91240B29-F687-4f45-9708-019B960494DF}">
-                <a14:hiddenLine xmlns:a14="http://schemas.microsoft.com/office/drawing/2010/main" xmlns="" w="9525">
+                <a14:hiddenLine xmlns="" xmlns:a14="http://schemas.microsoft.com/office/drawing/2010/main" w="9525">
                   <a:solidFill>
                     <a:srgbClr val="000000"/>
                   </a:solidFill>
@@ -3417,7 +2509,7 @@
             </a:ln>
             <a:extLst>
               <a:ext uri="{91240B29-F687-4f45-9708-019B960494DF}">
-                <a14:hiddenLine xmlns:a14="http://schemas.microsoft.com/office/drawing/2010/main" xmlns="" w="9525">
+                <a14:hiddenLine xmlns="" xmlns:a14="http://schemas.microsoft.com/office/drawing/2010/main" w="9525">
                   <a:solidFill>
                     <a:srgbClr val="000000"/>
                   </a:solidFill>
@@ -3479,7 +2571,7 @@
             </a:ln>
             <a:extLst>
               <a:ext uri="{91240B29-F687-4f45-9708-019B960494DF}">
-                <a14:hiddenLine xmlns:a14="http://schemas.microsoft.com/office/drawing/2010/main" xmlns="" w="9525">
+                <a14:hiddenLine xmlns="" xmlns:a14="http://schemas.microsoft.com/office/drawing/2010/main" w="9525">
                   <a:solidFill>
                     <a:srgbClr val="000000"/>
                   </a:solidFill>
@@ -3569,7 +2661,7 @@
             </a:ln>
             <a:extLst>
               <a:ext uri="{91240B29-F687-4f45-9708-019B960494DF}">
-                <a14:hiddenLine xmlns:a14="http://schemas.microsoft.com/office/drawing/2010/main" xmlns="" w="9525">
+                <a14:hiddenLine xmlns="" xmlns:a14="http://schemas.microsoft.com/office/drawing/2010/main" w="9525">
                   <a:solidFill>
                     <a:srgbClr val="000000"/>
                   </a:solidFill>
@@ -3637,7 +2729,7 @@
             </a:ln>
             <a:extLst>
               <a:ext uri="{91240B29-F687-4f45-9708-019B960494DF}">
-                <a14:hiddenLine xmlns:a14="http://schemas.microsoft.com/office/drawing/2010/main" xmlns="" w="9525">
+                <a14:hiddenLine xmlns="" xmlns:a14="http://schemas.microsoft.com/office/drawing/2010/main" w="9525">
                   <a:solidFill>
                     <a:srgbClr val="000000"/>
                   </a:solidFill>
@@ -3699,7 +2791,7 @@
             </a:ln>
             <a:extLst>
               <a:ext uri="{91240B29-F687-4f45-9708-019B960494DF}">
-                <a14:hiddenLine xmlns:a14="http://schemas.microsoft.com/office/drawing/2010/main" xmlns="" w="9525">
+                <a14:hiddenLine xmlns="" xmlns:a14="http://schemas.microsoft.com/office/drawing/2010/main" w="9525">
                   <a:solidFill>
                     <a:srgbClr val="000000"/>
                   </a:solidFill>
@@ -3789,7 +2881,7 @@
             </a:ln>
             <a:extLst>
               <a:ext uri="{91240B29-F687-4f45-9708-019B960494DF}">
-                <a14:hiddenLine xmlns:a14="http://schemas.microsoft.com/office/drawing/2010/main" xmlns="" w="9525">
+                <a14:hiddenLine xmlns="" xmlns:a14="http://schemas.microsoft.com/office/drawing/2010/main" w="9525">
                   <a:solidFill>
                     <a:srgbClr val="000000"/>
                   </a:solidFill>
@@ -3851,7 +2943,7 @@
             </a:ln>
             <a:extLst>
               <a:ext uri="{91240B29-F687-4f45-9708-019B960494DF}">
-                <a14:hiddenLine xmlns:a14="http://schemas.microsoft.com/office/drawing/2010/main" xmlns="" w="9525">
+                <a14:hiddenLine xmlns="" xmlns:a14="http://schemas.microsoft.com/office/drawing/2010/main" w="9525">
                   <a:solidFill>
                     <a:srgbClr val="000000"/>
                   </a:solidFill>
@@ -3941,7 +3033,7 @@
             </a:ln>
             <a:extLst>
               <a:ext uri="{91240B29-F687-4f45-9708-019B960494DF}">
-                <a14:hiddenLine xmlns:a14="http://schemas.microsoft.com/office/drawing/2010/main" xmlns="" w="9525">
+                <a14:hiddenLine xmlns="" xmlns:a14="http://schemas.microsoft.com/office/drawing/2010/main" w="9525">
                   <a:solidFill>
                     <a:srgbClr val="000000"/>
                   </a:solidFill>
@@ -4003,7 +3095,7 @@
             </a:ln>
             <a:extLst>
               <a:ext uri="{91240B29-F687-4f45-9708-019B960494DF}">
-                <a14:hiddenLine xmlns:a14="http://schemas.microsoft.com/office/drawing/2010/main" xmlns="" w="9525">
+                <a14:hiddenLine xmlns="" xmlns:a14="http://schemas.microsoft.com/office/drawing/2010/main" w="9525">
                   <a:solidFill>
                     <a:srgbClr val="000000"/>
                   </a:solidFill>
@@ -4093,7 +3185,7 @@
             </a:ln>
             <a:extLst>
               <a:ext uri="{91240B29-F687-4f45-9708-019B960494DF}">
-                <a14:hiddenLine xmlns:a14="http://schemas.microsoft.com/office/drawing/2010/main" xmlns="" w="9525">
+                <a14:hiddenLine xmlns="" xmlns:a14="http://schemas.microsoft.com/office/drawing/2010/main" w="9525">
                   <a:solidFill>
                     <a:srgbClr val="000000"/>
                   </a:solidFill>
@@ -4127,7 +3219,7 @@
             </a:ln>
             <a:extLst>
               <a:ext uri="{91240B29-F687-4f45-9708-019B960494DF}">
-                <a14:hiddenLine xmlns:a14="http://schemas.microsoft.com/office/drawing/2010/main" xmlns="" w="9525">
+                <a14:hiddenLine xmlns="" xmlns:a14="http://schemas.microsoft.com/office/drawing/2010/main" w="9525">
                   <a:solidFill>
                     <a:srgbClr val="000000"/>
                   </a:solidFill>
@@ -4192,7 +3284,7 @@
             </a:ln>
             <a:extLst>
               <a:ext uri="{91240B29-F687-4f45-9708-019B960494DF}">
-                <a14:hiddenLine xmlns:a14="http://schemas.microsoft.com/office/drawing/2010/main" xmlns="" w="9525">
+                <a14:hiddenLine xmlns="" xmlns:a14="http://schemas.microsoft.com/office/drawing/2010/main" w="9525">
                   <a:solidFill>
                     <a:srgbClr val="000000"/>
                   </a:solidFill>
@@ -4282,7 +3374,7 @@
             </a:ln>
             <a:extLst>
               <a:ext uri="{91240B29-F687-4f45-9708-019B960494DF}">
-                <a14:hiddenLine xmlns:a14="http://schemas.microsoft.com/office/drawing/2010/main" xmlns="" w="9525">
+                <a14:hiddenLine xmlns="" xmlns:a14="http://schemas.microsoft.com/office/drawing/2010/main" w="9525">
                   <a:solidFill>
                     <a:srgbClr val="000000"/>
                   </a:solidFill>
@@ -4344,7 +3436,7 @@
             </a:ln>
             <a:extLst>
               <a:ext uri="{91240B29-F687-4f45-9708-019B960494DF}">
-                <a14:hiddenLine xmlns:a14="http://schemas.microsoft.com/office/drawing/2010/main" xmlns="" w="9525">
+                <a14:hiddenLine xmlns="" xmlns:a14="http://schemas.microsoft.com/office/drawing/2010/main" w="9525">
                   <a:solidFill>
                     <a:srgbClr val="000000"/>
                   </a:solidFill>
@@ -4434,7 +3526,7 @@
             </a:ln>
             <a:extLst>
               <a:ext uri="{91240B29-F687-4f45-9708-019B960494DF}">
-                <a14:hiddenLine xmlns:a14="http://schemas.microsoft.com/office/drawing/2010/main" xmlns="" w="9525">
+                <a14:hiddenLine xmlns="" xmlns:a14="http://schemas.microsoft.com/office/drawing/2010/main" w="9525">
                   <a:solidFill>
                     <a:srgbClr val="000000"/>
                   </a:solidFill>
@@ -4524,7 +3616,7 @@
             </a:ln>
             <a:extLst>
               <a:ext uri="{91240B29-F687-4f45-9708-019B960494DF}">
-                <a14:hiddenLine xmlns:a14="http://schemas.microsoft.com/office/drawing/2010/main" xmlns="" w="9525">
+                <a14:hiddenLine xmlns="" xmlns:a14="http://schemas.microsoft.com/office/drawing/2010/main" w="9525">
                   <a:solidFill>
                     <a:srgbClr val="000000"/>
                   </a:solidFill>
@@ -4589,7 +3681,7 @@
             </a:ln>
             <a:extLst>
               <a:ext uri="{91240B29-F687-4f45-9708-019B960494DF}">
-                <a14:hiddenLine xmlns:a14="http://schemas.microsoft.com/office/drawing/2010/main" xmlns="" w="9525">
+                <a14:hiddenLine xmlns="" xmlns:a14="http://schemas.microsoft.com/office/drawing/2010/main" w="9525">
                   <a:solidFill>
                     <a:srgbClr val="000000"/>
                   </a:solidFill>
@@ -4651,7 +3743,7 @@
             </a:ln>
             <a:extLst>
               <a:ext uri="{91240B29-F687-4f45-9708-019B960494DF}">
-                <a14:hiddenLine xmlns:a14="http://schemas.microsoft.com/office/drawing/2010/main" xmlns="" w="9525">
+                <a14:hiddenLine xmlns="" xmlns:a14="http://schemas.microsoft.com/office/drawing/2010/main" w="9525">
                   <a:solidFill>
                     <a:srgbClr val="000000"/>
                   </a:solidFill>
@@ -4741,7 +3833,7 @@
             </a:ln>
             <a:extLst>
               <a:ext uri="{91240B29-F687-4f45-9708-019B960494DF}">
-                <a14:hiddenLine xmlns:a14="http://schemas.microsoft.com/office/drawing/2010/main" xmlns="" w="9525">
+                <a14:hiddenLine xmlns="" xmlns:a14="http://schemas.microsoft.com/office/drawing/2010/main" w="9525">
                   <a:solidFill>
                     <a:srgbClr val="000000"/>
                   </a:solidFill>
@@ -4831,7 +3923,7 @@
             </a:ln>
             <a:extLst>
               <a:ext uri="{91240B29-F687-4f45-9708-019B960494DF}">
-                <a14:hiddenLine xmlns:a14="http://schemas.microsoft.com/office/drawing/2010/main" xmlns="" w="9525">
+                <a14:hiddenLine xmlns="" xmlns:a14="http://schemas.microsoft.com/office/drawing/2010/main" w="9525">
                   <a:solidFill>
                     <a:srgbClr val="000000"/>
                   </a:solidFill>
@@ -4893,7 +3985,7 @@
             </a:ln>
             <a:extLst>
               <a:ext uri="{91240B29-F687-4f45-9708-019B960494DF}">
-                <a14:hiddenLine xmlns:a14="http://schemas.microsoft.com/office/drawing/2010/main" xmlns="" w="9525">
+                <a14:hiddenLine xmlns="" xmlns:a14="http://schemas.microsoft.com/office/drawing/2010/main" w="9525">
                   <a:solidFill>
                     <a:srgbClr val="000000"/>
                   </a:solidFill>
@@ -5013,7 +4105,7 @@
             </a:ln>
             <a:extLst>
               <a:ext uri="{91240B29-F687-4f45-9708-019B960494DF}">
-                <a14:hiddenLine xmlns:a14="http://schemas.microsoft.com/office/drawing/2010/main" xmlns="" w="9525">
+                <a14:hiddenLine xmlns="" xmlns:a14="http://schemas.microsoft.com/office/drawing/2010/main" w="9525">
                   <a:solidFill>
                     <a:srgbClr val="000000"/>
                   </a:solidFill>
@@ -5081,7 +4173,7 @@
             </a:ln>
             <a:extLst>
               <a:ext uri="{91240B29-F687-4f45-9708-019B960494DF}">
-                <a14:hiddenLine xmlns:a14="http://schemas.microsoft.com/office/drawing/2010/main" xmlns="" w="9525">
+                <a14:hiddenLine xmlns="" xmlns:a14="http://schemas.microsoft.com/office/drawing/2010/main" w="9525">
                   <a:solidFill>
                     <a:srgbClr val="000000"/>
                   </a:solidFill>
@@ -5171,7 +4263,7 @@
             </a:ln>
             <a:extLst>
               <a:ext uri="{91240B29-F687-4f45-9708-019B960494DF}">
-                <a14:hiddenLine xmlns:a14="http://schemas.microsoft.com/office/drawing/2010/main" xmlns="" w="9525">
+                <a14:hiddenLine xmlns="" xmlns:a14="http://schemas.microsoft.com/office/drawing/2010/main" w="9525">
                   <a:solidFill>
                     <a:srgbClr val="000000"/>
                   </a:solidFill>
@@ -9993,7 +9085,7 @@
           <a:noFill/>
           <a:extLst>
             <a:ext uri="{909E8E84-426E-40dd-AFC4-6F175D3DCCD1}">
-              <a14:hiddenFill xmlns:a14="http://schemas.microsoft.com/office/drawing/2010/main" xmlns="">
+              <a14:hiddenFill xmlns="" xmlns:a14="http://schemas.microsoft.com/office/drawing/2010/main">
                 <a:solidFill>
                   <a:srgbClr val="FFFFFF"/>
                 </a:solidFill>
@@ -10067,7 +9159,7 @@
               </a:ln>
               <a:extLst>
                 <a:ext uri="{91240B29-F687-4f45-9708-019B960494DF}">
-                  <a14:hiddenLine xmlns:a14="http://schemas.microsoft.com/office/drawing/2010/main" xmlns="" w="9525">
+                  <a14:hiddenLine xmlns="" xmlns:a14="http://schemas.microsoft.com/office/drawing/2010/main" w="9525">
                     <a:solidFill>
                       <a:srgbClr val="000000"/>
                     </a:solidFill>
@@ -10157,7 +9249,7 @@
               </a:ln>
               <a:extLst>
                 <a:ext uri="{91240B29-F687-4f45-9708-019B960494DF}">
-                  <a14:hiddenLine xmlns:a14="http://schemas.microsoft.com/office/drawing/2010/main" xmlns="" w="9525">
+                  <a14:hiddenLine xmlns="" xmlns:a14="http://schemas.microsoft.com/office/drawing/2010/main" w="9525">
                     <a:solidFill>
                       <a:srgbClr val="000000"/>
                     </a:solidFill>
@@ -10247,7 +9339,7 @@
               </a:ln>
               <a:extLst>
                 <a:ext uri="{91240B29-F687-4f45-9708-019B960494DF}">
-                  <a14:hiddenLine xmlns:a14="http://schemas.microsoft.com/office/drawing/2010/main" xmlns="" w="9525">
+                  <a14:hiddenLine xmlns="" xmlns:a14="http://schemas.microsoft.com/office/drawing/2010/main" w="9525">
                     <a:solidFill>
                       <a:srgbClr val="000000"/>
                     </a:solidFill>
@@ -10309,7 +9401,7 @@
               </a:ln>
               <a:extLst>
                 <a:ext uri="{91240B29-F687-4f45-9708-019B960494DF}">
-                  <a14:hiddenLine xmlns:a14="http://schemas.microsoft.com/office/drawing/2010/main" xmlns="" w="9525">
+                  <a14:hiddenLine xmlns="" xmlns:a14="http://schemas.microsoft.com/office/drawing/2010/main" w="9525">
                     <a:solidFill>
                       <a:srgbClr val="000000"/>
                     </a:solidFill>
@@ -10399,7 +9491,7 @@
               </a:ln>
               <a:extLst>
                 <a:ext uri="{91240B29-F687-4f45-9708-019B960494DF}">
-                  <a14:hiddenLine xmlns:a14="http://schemas.microsoft.com/office/drawing/2010/main" xmlns="" w="9525">
+                  <a14:hiddenLine xmlns="" xmlns:a14="http://schemas.microsoft.com/office/drawing/2010/main" w="9525">
                     <a:solidFill>
                       <a:srgbClr val="000000"/>
                     </a:solidFill>
@@ -10461,7 +9553,7 @@
               </a:ln>
               <a:extLst>
                 <a:ext uri="{91240B29-F687-4f45-9708-019B960494DF}">
-                  <a14:hiddenLine xmlns:a14="http://schemas.microsoft.com/office/drawing/2010/main" xmlns="" w="9525">
+                  <a14:hiddenLine xmlns="" xmlns:a14="http://schemas.microsoft.com/office/drawing/2010/main" w="9525">
                     <a:solidFill>
                       <a:srgbClr val="000000"/>
                     </a:solidFill>
@@ -10523,7 +9615,7 @@
               </a:ln>
               <a:extLst>
                 <a:ext uri="{91240B29-F687-4f45-9708-019B960494DF}">
-                  <a14:hiddenLine xmlns:a14="http://schemas.microsoft.com/office/drawing/2010/main" xmlns="" w="9525">
+                  <a14:hiddenLine xmlns="" xmlns:a14="http://schemas.microsoft.com/office/drawing/2010/main" w="9525">
                     <a:solidFill>
                       <a:srgbClr val="000000"/>
                     </a:solidFill>
@@ -10613,7 +9705,7 @@
               </a:ln>
               <a:extLst>
                 <a:ext uri="{91240B29-F687-4f45-9708-019B960494DF}">
-                  <a14:hiddenLine xmlns:a14="http://schemas.microsoft.com/office/drawing/2010/main" xmlns="" w="9525">
+                  <a14:hiddenLine xmlns="" xmlns:a14="http://schemas.microsoft.com/office/drawing/2010/main" w="9525">
                     <a:solidFill>
                       <a:srgbClr val="000000"/>
                     </a:solidFill>
@@ -10703,7 +9795,7 @@
               </a:ln>
               <a:extLst>
                 <a:ext uri="{91240B29-F687-4f45-9708-019B960494DF}">
-                  <a14:hiddenLine xmlns:a14="http://schemas.microsoft.com/office/drawing/2010/main" xmlns="" w="9525">
+                  <a14:hiddenLine xmlns="" xmlns:a14="http://schemas.microsoft.com/office/drawing/2010/main" w="9525">
                     <a:solidFill>
                       <a:srgbClr val="000000"/>
                     </a:solidFill>
@@ -10765,7 +9857,7 @@
               </a:ln>
               <a:extLst>
                 <a:ext uri="{91240B29-F687-4f45-9708-019B960494DF}">
-                  <a14:hiddenLine xmlns:a14="http://schemas.microsoft.com/office/drawing/2010/main" xmlns="" w="9525">
+                  <a14:hiddenLine xmlns="" xmlns:a14="http://schemas.microsoft.com/office/drawing/2010/main" w="9525">
                     <a:solidFill>
                       <a:srgbClr val="000000"/>
                     </a:solidFill>
@@ -10875,7 +9967,7 @@
               </a:ln>
               <a:extLst>
                 <a:ext uri="{91240B29-F687-4f45-9708-019B960494DF}">
-                  <a14:hiddenLine xmlns:a14="http://schemas.microsoft.com/office/drawing/2010/main" xmlns="" w="9525">
+                  <a14:hiddenLine xmlns="" xmlns:a14="http://schemas.microsoft.com/office/drawing/2010/main" w="9525">
                     <a:solidFill>
                       <a:srgbClr val="000000"/>
                     </a:solidFill>
@@ -10959,7 +10051,7 @@
               </a:ln>
               <a:extLst>
                 <a:ext uri="{91240B29-F687-4f45-9708-019B960494DF}">
-                  <a14:hiddenLine xmlns:a14="http://schemas.microsoft.com/office/drawing/2010/main" xmlns="" w="9525">
+                  <a14:hiddenLine xmlns="" xmlns:a14="http://schemas.microsoft.com/office/drawing/2010/main" w="9525">
                     <a:solidFill>
                       <a:srgbClr val="000000"/>
                     </a:solidFill>
@@ -11021,7 +10113,7 @@
               </a:ln>
               <a:extLst>
                 <a:ext uri="{91240B29-F687-4f45-9708-019B960494DF}">
-                  <a14:hiddenLine xmlns:a14="http://schemas.microsoft.com/office/drawing/2010/main" xmlns="" w="9525">
+                  <a14:hiddenLine xmlns="" xmlns:a14="http://schemas.microsoft.com/office/drawing/2010/main" w="9525">
                     <a:solidFill>
                       <a:srgbClr val="000000"/>
                     </a:solidFill>
@@ -11083,7 +10175,7 @@
               </a:ln>
               <a:extLst>
                 <a:ext uri="{91240B29-F687-4f45-9708-019B960494DF}">
-                  <a14:hiddenLine xmlns:a14="http://schemas.microsoft.com/office/drawing/2010/main" xmlns="" w="9525">
+                  <a14:hiddenLine xmlns="" xmlns:a14="http://schemas.microsoft.com/office/drawing/2010/main" w="9525">
                     <a:solidFill>
                       <a:srgbClr val="000000"/>
                     </a:solidFill>
@@ -11173,7 +10265,7 @@
               </a:ln>
               <a:extLst>
                 <a:ext uri="{91240B29-F687-4f45-9708-019B960494DF}">
-                  <a14:hiddenLine xmlns:a14="http://schemas.microsoft.com/office/drawing/2010/main" xmlns="" w="9525">
+                  <a14:hiddenLine xmlns="" xmlns:a14="http://schemas.microsoft.com/office/drawing/2010/main" w="9525">
                     <a:solidFill>
                       <a:srgbClr val="000000"/>
                     </a:solidFill>
@@ -11207,7 +10299,7 @@
               </a:ln>
               <a:extLst>
                 <a:ext uri="{91240B29-F687-4f45-9708-019B960494DF}">
-                  <a14:hiddenLine xmlns:a14="http://schemas.microsoft.com/office/drawing/2010/main" xmlns="" w="9525">
+                  <a14:hiddenLine xmlns="" xmlns:a14="http://schemas.microsoft.com/office/drawing/2010/main" w="9525">
                     <a:solidFill>
                       <a:srgbClr val="000000"/>
                     </a:solidFill>
@@ -11272,7 +10364,7 @@
               </a:ln>
               <a:extLst>
                 <a:ext uri="{91240B29-F687-4f45-9708-019B960494DF}">
-                  <a14:hiddenLine xmlns:a14="http://schemas.microsoft.com/office/drawing/2010/main" xmlns="" w="9525">
+                  <a14:hiddenLine xmlns="" xmlns:a14="http://schemas.microsoft.com/office/drawing/2010/main" w="9525">
                     <a:solidFill>
                       <a:srgbClr val="000000"/>
                     </a:solidFill>
@@ -11362,7 +10454,7 @@
               </a:ln>
               <a:extLst>
                 <a:ext uri="{91240B29-F687-4f45-9708-019B960494DF}">
-                  <a14:hiddenLine xmlns:a14="http://schemas.microsoft.com/office/drawing/2010/main" xmlns="" w="9525">
+                  <a14:hiddenLine xmlns="" xmlns:a14="http://schemas.microsoft.com/office/drawing/2010/main" w="9525">
                     <a:solidFill>
                       <a:srgbClr val="000000"/>
                     </a:solidFill>
@@ -11424,7 +10516,7 @@
               </a:ln>
               <a:extLst>
                 <a:ext uri="{91240B29-F687-4f45-9708-019B960494DF}">
-                  <a14:hiddenLine xmlns:a14="http://schemas.microsoft.com/office/drawing/2010/main" xmlns="" w="9525">
+                  <a14:hiddenLine xmlns="" xmlns:a14="http://schemas.microsoft.com/office/drawing/2010/main" w="9525">
                     <a:solidFill>
                       <a:srgbClr val="000000"/>
                     </a:solidFill>
@@ -11514,7 +10606,7 @@
               </a:ln>
               <a:extLst>
                 <a:ext uri="{91240B29-F687-4f45-9708-019B960494DF}">
-                  <a14:hiddenLine xmlns:a14="http://schemas.microsoft.com/office/drawing/2010/main" xmlns="" w="9525">
+                  <a14:hiddenLine xmlns="" xmlns:a14="http://schemas.microsoft.com/office/drawing/2010/main" w="9525">
                     <a:solidFill>
                       <a:srgbClr val="000000"/>
                     </a:solidFill>
@@ -11579,7 +10671,7 @@
               </a:ln>
               <a:extLst>
                 <a:ext uri="{91240B29-F687-4f45-9708-019B960494DF}">
-                  <a14:hiddenLine xmlns:a14="http://schemas.microsoft.com/office/drawing/2010/main" xmlns="" w="9525">
+                  <a14:hiddenLine xmlns="" xmlns:a14="http://schemas.microsoft.com/office/drawing/2010/main" w="9525">
                     <a:solidFill>
                       <a:srgbClr val="000000"/>
                     </a:solidFill>
@@ -11641,7 +10733,7 @@
               </a:ln>
               <a:extLst>
                 <a:ext uri="{91240B29-F687-4f45-9708-019B960494DF}">
-                  <a14:hiddenLine xmlns:a14="http://schemas.microsoft.com/office/drawing/2010/main" xmlns="" w="9525">
+                  <a14:hiddenLine xmlns="" xmlns:a14="http://schemas.microsoft.com/office/drawing/2010/main" w="9525">
                     <a:solidFill>
                       <a:srgbClr val="000000"/>
                     </a:solidFill>
@@ -11731,7 +10823,7 @@
               </a:ln>
               <a:extLst>
                 <a:ext uri="{91240B29-F687-4f45-9708-019B960494DF}">
-                  <a14:hiddenLine xmlns:a14="http://schemas.microsoft.com/office/drawing/2010/main" xmlns="" w="9525">
+                  <a14:hiddenLine xmlns="" xmlns:a14="http://schemas.microsoft.com/office/drawing/2010/main" w="9525">
                     <a:solidFill>
                       <a:srgbClr val="000000"/>
                     </a:solidFill>
@@ -11821,7 +10913,7 @@
               </a:ln>
               <a:extLst>
                 <a:ext uri="{91240B29-F687-4f45-9708-019B960494DF}">
-                  <a14:hiddenLine xmlns:a14="http://schemas.microsoft.com/office/drawing/2010/main" xmlns="" w="9525">
+                  <a14:hiddenLine xmlns="" xmlns:a14="http://schemas.microsoft.com/office/drawing/2010/main" w="9525">
                     <a:solidFill>
                       <a:srgbClr val="000000"/>
                     </a:solidFill>
@@ -11886,7 +10978,7 @@
               </a:ln>
               <a:extLst>
                 <a:ext uri="{91240B29-F687-4f45-9708-019B960494DF}">
-                  <a14:hiddenLine xmlns:a14="http://schemas.microsoft.com/office/drawing/2010/main" xmlns="" w="9525">
+                  <a14:hiddenLine xmlns="" xmlns:a14="http://schemas.microsoft.com/office/drawing/2010/main" w="9525">
                     <a:solidFill>
                       <a:srgbClr val="000000"/>
                     </a:solidFill>
@@ -12006,7 +11098,7 @@
               </a:ln>
               <a:extLst>
                 <a:ext uri="{91240B29-F687-4f45-9708-019B960494DF}">
-                  <a14:hiddenLine xmlns:a14="http://schemas.microsoft.com/office/drawing/2010/main" xmlns="" w="9525">
+                  <a14:hiddenLine xmlns="" xmlns:a14="http://schemas.microsoft.com/office/drawing/2010/main" w="9525">
                     <a:solidFill>
                       <a:srgbClr val="000000"/>
                     </a:solidFill>
@@ -12104,7 +11196,7 @@
               </a:ln>
               <a:extLst>
                 <a:ext uri="{91240B29-F687-4f45-9708-019B960494DF}">
-                  <a14:hiddenLine xmlns:a14="http://schemas.microsoft.com/office/drawing/2010/main" xmlns="" w="9525">
+                  <a14:hiddenLine xmlns="" xmlns:a14="http://schemas.microsoft.com/office/drawing/2010/main" w="9525">
                     <a:solidFill>
                       <a:srgbClr val="000000"/>
                     </a:solidFill>
@@ -12219,7 +11311,7 @@
               </a:ln>
               <a:extLst>
                 <a:ext uri="{91240B29-F687-4f45-9708-019B960494DF}">
-                  <a14:hiddenLine xmlns:a14="http://schemas.microsoft.com/office/drawing/2010/main" xmlns="" w="9525">
+                  <a14:hiddenLine xmlns="" xmlns:a14="http://schemas.microsoft.com/office/drawing/2010/main" w="9525">
                     <a:solidFill>
                       <a:srgbClr val="000000"/>
                     </a:solidFill>
@@ -12309,7 +11401,7 @@
               </a:ln>
               <a:extLst>
                 <a:ext uri="{91240B29-F687-4f45-9708-019B960494DF}">
-                  <a14:hiddenLine xmlns:a14="http://schemas.microsoft.com/office/drawing/2010/main" xmlns="" w="9525">
+                  <a14:hiddenLine xmlns="" xmlns:a14="http://schemas.microsoft.com/office/drawing/2010/main" w="9525">
                     <a:solidFill>
                       <a:srgbClr val="000000"/>
                     </a:solidFill>
@@ -12374,7 +11466,7 @@
               </a:ln>
               <a:extLst>
                 <a:ext uri="{91240B29-F687-4f45-9708-019B960494DF}">
-                  <a14:hiddenLine xmlns:a14="http://schemas.microsoft.com/office/drawing/2010/main" xmlns="" w="9525">
+                  <a14:hiddenLine xmlns="" xmlns:a14="http://schemas.microsoft.com/office/drawing/2010/main" w="9525">
                     <a:solidFill>
                       <a:srgbClr val="000000"/>
                     </a:solidFill>
@@ -12464,7 +11556,7 @@
               </a:ln>
               <a:extLst>
                 <a:ext uri="{91240B29-F687-4f45-9708-019B960494DF}">
-                  <a14:hiddenLine xmlns:a14="http://schemas.microsoft.com/office/drawing/2010/main" xmlns="" w="9525">
+                  <a14:hiddenLine xmlns="" xmlns:a14="http://schemas.microsoft.com/office/drawing/2010/main" w="9525">
                     <a:solidFill>
                       <a:srgbClr val="000000"/>
                     </a:solidFill>
@@ -12532,7 +11624,7 @@
               </a:ln>
               <a:extLst>
                 <a:ext uri="{91240B29-F687-4f45-9708-019B960494DF}">
-                  <a14:hiddenLine xmlns:a14="http://schemas.microsoft.com/office/drawing/2010/main" xmlns="" w="9525">
+                  <a14:hiddenLine xmlns="" xmlns:a14="http://schemas.microsoft.com/office/drawing/2010/main" w="9525">
                     <a:solidFill>
                       <a:srgbClr val="000000"/>
                     </a:solidFill>
@@ -12622,7 +11714,7 @@
               </a:ln>
               <a:extLst>
                 <a:ext uri="{91240B29-F687-4f45-9708-019B960494DF}">
-                  <a14:hiddenLine xmlns:a14="http://schemas.microsoft.com/office/drawing/2010/main" xmlns="" w="9525">
+                  <a14:hiddenLine xmlns="" xmlns:a14="http://schemas.microsoft.com/office/drawing/2010/main" w="9525">
                     <a:solidFill>
                       <a:srgbClr val="000000"/>
                     </a:solidFill>
@@ -12690,7 +11782,7 @@
               </a:ln>
               <a:extLst>
                 <a:ext uri="{91240B29-F687-4f45-9708-019B960494DF}">
-                  <a14:hiddenLine xmlns:a14="http://schemas.microsoft.com/office/drawing/2010/main" xmlns="" w="9525">
+                  <a14:hiddenLine xmlns="" xmlns:a14="http://schemas.microsoft.com/office/drawing/2010/main" w="9525">
                     <a:solidFill>
                       <a:srgbClr val="000000"/>
                     </a:solidFill>
@@ -12780,7 +11872,7 @@
               </a:ln>
               <a:extLst>
                 <a:ext uri="{91240B29-F687-4f45-9708-019B960494DF}">
-                  <a14:hiddenLine xmlns:a14="http://schemas.microsoft.com/office/drawing/2010/main" xmlns="" w="9525">
+                  <a14:hiddenLine xmlns="" xmlns:a14="http://schemas.microsoft.com/office/drawing/2010/main" w="9525">
                     <a:solidFill>
                       <a:srgbClr val="000000"/>
                     </a:solidFill>
@@ -12814,7 +11906,7 @@
               </a:ln>
               <a:extLst>
                 <a:ext uri="{91240B29-F687-4f45-9708-019B960494DF}">
-                  <a14:hiddenLine xmlns:a14="http://schemas.microsoft.com/office/drawing/2010/main" xmlns="" w="9525">
+                  <a14:hiddenLine xmlns="" xmlns:a14="http://schemas.microsoft.com/office/drawing/2010/main" w="9525">
                     <a:solidFill>
                       <a:srgbClr val="000000"/>
                     </a:solidFill>
@@ -13576,6 +12668,687 @@
 </p:sld>
 </file>
 
+<file path=ppt/slides/slide10.xml><?xml version="1.0" encoding="utf-8"?>
+<p:sld xmlns:a="http://schemas.openxmlformats.org/drawingml/2006/main" xmlns:r="http://schemas.openxmlformats.org/officeDocument/2006/relationships" xmlns:p="http://schemas.openxmlformats.org/presentationml/2006/main">
+  <p:cSld>
+    <p:spTree>
+      <p:nvGrpSpPr>
+        <p:cNvPr id="1" name=""/>
+        <p:cNvGrpSpPr/>
+        <p:nvPr/>
+      </p:nvGrpSpPr>
+      <p:grpSpPr>
+        <a:xfrm>
+          <a:off x="0" y="0"/>
+          <a:ext cx="0" cy="0"/>
+          <a:chOff x="0" y="0"/>
+          <a:chExt cx="0" cy="0"/>
+        </a:xfrm>
+      </p:grpSpPr>
+      <p:sp>
+        <p:nvSpPr>
+          <p:cNvPr id="2" name="Title 1">
+            <a:extLst>
+              <a:ext uri="{FF2B5EF4-FFF2-40B4-BE49-F238E27FC236}">
+                <a16:creationId xmlns:a16="http://schemas.microsoft.com/office/drawing/2014/main" id="{4851F5E9-24D0-D645-B1EF-7A599B4B7E42}"/>
+              </a:ext>
+            </a:extLst>
+          </p:cNvPr>
+          <p:cNvSpPr>
+            <a:spLocks noGrp="1"/>
+          </p:cNvSpPr>
+          <p:nvPr>
+            <p:ph type="title"/>
+          </p:nvPr>
+        </p:nvSpPr>
+        <p:spPr/>
+        <p:txBody>
+          <a:bodyPr/>
+          <a:lstStyle/>
+          <a:p>
+            <a:r>
+              <a:rPr lang="en-US" dirty="0">
+                <a:solidFill>
+                  <a:schemeClr val="bg1"/>
+                </a:solidFill>
+              </a:rPr>
+              <a:t>Aditya </a:t>
+            </a:r>
+            <a:r>
+              <a:rPr lang="en-US" dirty="0" err="1">
+                <a:solidFill>
+                  <a:schemeClr val="bg1"/>
+                </a:solidFill>
+              </a:rPr>
+              <a:t>Rajguru</a:t>
+            </a:r>
+            <a:endParaRPr lang="en-US" dirty="0">
+              <a:solidFill>
+                <a:schemeClr val="bg1"/>
+              </a:solidFill>
+            </a:endParaRPr>
+          </a:p>
+        </p:txBody>
+      </p:sp>
+      <p:sp>
+        <p:nvSpPr>
+          <p:cNvPr id="3" name="Content Placeholder 2">
+            <a:extLst>
+              <a:ext uri="{FF2B5EF4-FFF2-40B4-BE49-F238E27FC236}">
+                <a16:creationId xmlns:a16="http://schemas.microsoft.com/office/drawing/2014/main" id="{A538401C-D28F-EA4A-9A7D-9EB601589938}"/>
+              </a:ext>
+            </a:extLst>
+          </p:cNvPr>
+          <p:cNvSpPr>
+            <a:spLocks noGrp="1"/>
+          </p:cNvSpPr>
+          <p:nvPr>
+            <p:ph idx="1"/>
+          </p:nvPr>
+        </p:nvSpPr>
+        <p:spPr/>
+        <p:txBody>
+          <a:bodyPr/>
+          <a:lstStyle/>
+          <a:p>
+            <a:endParaRPr lang="en-US" dirty="0">
+              <a:solidFill>
+                <a:schemeClr val="bg1"/>
+              </a:solidFill>
+            </a:endParaRPr>
+          </a:p>
+        </p:txBody>
+      </p:sp>
+    </p:spTree>
+    <p:extLst>
+      <p:ext uri="{BB962C8B-B14F-4D97-AF65-F5344CB8AC3E}">
+        <p14:creationId xmlns:p14="http://schemas.microsoft.com/office/powerpoint/2010/main" val="673712260"/>
+      </p:ext>
+    </p:extLst>
+  </p:cSld>
+  <p:clrMapOvr>
+    <a:masterClrMapping/>
+  </p:clrMapOvr>
+</p:sld>
+</file>
+
+<file path=ppt/slides/slide11.xml><?xml version="1.0" encoding="utf-8"?>
+<p:sld xmlns:a="http://schemas.openxmlformats.org/drawingml/2006/main" xmlns:r="http://schemas.openxmlformats.org/officeDocument/2006/relationships" xmlns:p="http://schemas.openxmlformats.org/presentationml/2006/main">
+  <p:cSld>
+    <p:spTree>
+      <p:nvGrpSpPr>
+        <p:cNvPr id="1" name=""/>
+        <p:cNvGrpSpPr/>
+        <p:nvPr/>
+      </p:nvGrpSpPr>
+      <p:grpSpPr>
+        <a:xfrm>
+          <a:off x="0" y="0"/>
+          <a:ext cx="0" cy="0"/>
+          <a:chOff x="0" y="0"/>
+          <a:chExt cx="0" cy="0"/>
+        </a:xfrm>
+      </p:grpSpPr>
+      <p:sp>
+        <p:nvSpPr>
+          <p:cNvPr id="2" name="Title 1">
+            <a:extLst>
+              <a:ext uri="{FF2B5EF4-FFF2-40B4-BE49-F238E27FC236}">
+                <a16:creationId xmlns:a16="http://schemas.microsoft.com/office/drawing/2014/main" id="{0A8B4792-B826-034D-A209-2E0A3F9BD57F}"/>
+              </a:ext>
+            </a:extLst>
+          </p:cNvPr>
+          <p:cNvSpPr>
+            <a:spLocks noGrp="1"/>
+          </p:cNvSpPr>
+          <p:nvPr>
+            <p:ph type="title"/>
+          </p:nvPr>
+        </p:nvSpPr>
+        <p:spPr/>
+        <p:txBody>
+          <a:bodyPr/>
+          <a:lstStyle/>
+          <a:p>
+            <a:r>
+              <a:rPr lang="en-US" dirty="0">
+                <a:solidFill>
+                  <a:schemeClr val="bg1"/>
+                </a:solidFill>
+              </a:rPr>
+              <a:t>Edgar Gonzalez</a:t>
+            </a:r>
+            <a:endParaRPr lang="en-US" dirty="0"/>
+          </a:p>
+        </p:txBody>
+      </p:sp>
+      <p:sp>
+        <p:nvSpPr>
+          <p:cNvPr id="3" name="Content Placeholder 2">
+            <a:extLst>
+              <a:ext uri="{FF2B5EF4-FFF2-40B4-BE49-F238E27FC236}">
+                <a16:creationId xmlns:a16="http://schemas.microsoft.com/office/drawing/2014/main" id="{ADA80B42-83C5-B043-B237-D9B4A2B3627E}"/>
+              </a:ext>
+            </a:extLst>
+          </p:cNvPr>
+          <p:cNvSpPr>
+            <a:spLocks noGrp="1"/>
+          </p:cNvSpPr>
+          <p:nvPr>
+            <p:ph idx="1"/>
+          </p:nvPr>
+        </p:nvSpPr>
+        <p:spPr/>
+        <p:txBody>
+          <a:bodyPr/>
+          <a:lstStyle/>
+          <a:p>
+            <a:endParaRPr lang="en-US" dirty="0">
+              <a:solidFill>
+                <a:schemeClr val="bg1"/>
+              </a:solidFill>
+            </a:endParaRPr>
+          </a:p>
+        </p:txBody>
+      </p:sp>
+    </p:spTree>
+    <p:extLst>
+      <p:ext uri="{BB962C8B-B14F-4D97-AF65-F5344CB8AC3E}">
+        <p14:creationId xmlns:p14="http://schemas.microsoft.com/office/powerpoint/2010/main" val="124291945"/>
+      </p:ext>
+    </p:extLst>
+  </p:cSld>
+  <p:clrMapOvr>
+    <a:masterClrMapping/>
+  </p:clrMapOvr>
+</p:sld>
+</file>
+
+<file path=ppt/slides/slide12.xml><?xml version="1.0" encoding="utf-8"?>
+<p:sld xmlns:a="http://schemas.openxmlformats.org/drawingml/2006/main" xmlns:r="http://schemas.openxmlformats.org/officeDocument/2006/relationships" xmlns:p="http://schemas.openxmlformats.org/presentationml/2006/main">
+  <p:cSld>
+    <p:spTree>
+      <p:nvGrpSpPr>
+        <p:cNvPr id="1" name=""/>
+        <p:cNvGrpSpPr/>
+        <p:nvPr/>
+      </p:nvGrpSpPr>
+      <p:grpSpPr>
+        <a:xfrm>
+          <a:off x="0" y="0"/>
+          <a:ext cx="0" cy="0"/>
+          <a:chOff x="0" y="0"/>
+          <a:chExt cx="0" cy="0"/>
+        </a:xfrm>
+      </p:grpSpPr>
+      <p:sp>
+        <p:nvSpPr>
+          <p:cNvPr id="2" name="Title 1">
+            <a:extLst>
+              <a:ext uri="{FF2B5EF4-FFF2-40B4-BE49-F238E27FC236}">
+                <a16:creationId xmlns:a16="http://schemas.microsoft.com/office/drawing/2014/main" id="{1441CEAA-DFD3-F240-8F79-EE16583BD0E8}"/>
+              </a:ext>
+            </a:extLst>
+          </p:cNvPr>
+          <p:cNvSpPr>
+            <a:spLocks noGrp="1"/>
+          </p:cNvSpPr>
+          <p:nvPr>
+            <p:ph type="title"/>
+          </p:nvPr>
+        </p:nvSpPr>
+        <p:spPr/>
+        <p:txBody>
+          <a:bodyPr/>
+          <a:lstStyle/>
+          <a:p>
+            <a:r>
+              <a:rPr lang="en-US" dirty="0" err="1">
+                <a:solidFill>
+                  <a:schemeClr val="bg1"/>
+                </a:solidFill>
+              </a:rPr>
+              <a:t>Atafo</a:t>
+            </a:r>
+            <a:r>
+              <a:rPr lang="en-US" dirty="0">
+                <a:solidFill>
+                  <a:schemeClr val="bg1"/>
+                </a:solidFill>
+              </a:rPr>
+              <a:t> Ayodele </a:t>
+            </a:r>
+            <a:r>
+              <a:rPr lang="en-US" dirty="0" err="1">
+                <a:solidFill>
+                  <a:schemeClr val="bg1"/>
+                </a:solidFill>
+              </a:rPr>
+              <a:t>Abure</a:t>
+            </a:r>
+            <a:endParaRPr lang="en-US" dirty="0"/>
+          </a:p>
+        </p:txBody>
+      </p:sp>
+      <p:sp>
+        <p:nvSpPr>
+          <p:cNvPr id="3" name="Content Placeholder 2">
+            <a:extLst>
+              <a:ext uri="{FF2B5EF4-FFF2-40B4-BE49-F238E27FC236}">
+                <a16:creationId xmlns:a16="http://schemas.microsoft.com/office/drawing/2014/main" id="{E413B084-A9B3-C742-8E34-B4241C17C27D}"/>
+              </a:ext>
+            </a:extLst>
+          </p:cNvPr>
+          <p:cNvSpPr>
+            <a:spLocks noGrp="1"/>
+          </p:cNvSpPr>
+          <p:nvPr>
+            <p:ph idx="1"/>
+          </p:nvPr>
+        </p:nvSpPr>
+        <p:spPr/>
+        <p:txBody>
+          <a:bodyPr/>
+          <a:lstStyle/>
+          <a:p>
+            <a:endParaRPr lang="en-US"/>
+          </a:p>
+        </p:txBody>
+      </p:sp>
+    </p:spTree>
+    <p:extLst>
+      <p:ext uri="{BB962C8B-B14F-4D97-AF65-F5344CB8AC3E}">
+        <p14:creationId xmlns:p14="http://schemas.microsoft.com/office/powerpoint/2010/main" val="2772915284"/>
+      </p:ext>
+    </p:extLst>
+  </p:cSld>
+  <p:clrMapOvr>
+    <a:masterClrMapping/>
+  </p:clrMapOvr>
+</p:sld>
+</file>
+
+<file path=ppt/slides/slide13.xml><?xml version="1.0" encoding="utf-8"?>
+<p:sld xmlns:a="http://schemas.openxmlformats.org/drawingml/2006/main" xmlns:r="http://schemas.openxmlformats.org/officeDocument/2006/relationships" xmlns:p="http://schemas.openxmlformats.org/presentationml/2006/main">
+  <p:cSld>
+    <p:spTree>
+      <p:nvGrpSpPr>
+        <p:cNvPr id="1" name=""/>
+        <p:cNvGrpSpPr/>
+        <p:nvPr/>
+      </p:nvGrpSpPr>
+      <p:grpSpPr>
+        <a:xfrm>
+          <a:off x="0" y="0"/>
+          <a:ext cx="0" cy="0"/>
+          <a:chOff x="0" y="0"/>
+          <a:chExt cx="0" cy="0"/>
+        </a:xfrm>
+      </p:grpSpPr>
+      <p:sp>
+        <p:nvSpPr>
+          <p:cNvPr id="2" name="Title 1">
+            <a:extLst>
+              <a:ext uri="{FF2B5EF4-FFF2-40B4-BE49-F238E27FC236}">
+                <a16:creationId xmlns:a16="http://schemas.microsoft.com/office/drawing/2014/main" id="{C20860AF-E7D6-A144-B4B4-45BA4DF103CB}"/>
+              </a:ext>
+            </a:extLst>
+          </p:cNvPr>
+          <p:cNvSpPr>
+            <a:spLocks noGrp="1"/>
+          </p:cNvSpPr>
+          <p:nvPr>
+            <p:ph type="title"/>
+          </p:nvPr>
+        </p:nvSpPr>
+        <p:spPr/>
+        <p:txBody>
+          <a:bodyPr/>
+          <a:lstStyle/>
+          <a:p>
+            <a:r>
+              <a:rPr lang="en-US" dirty="0" err="1">
+                <a:solidFill>
+                  <a:schemeClr val="bg1"/>
+                </a:solidFill>
+              </a:rPr>
+              <a:t>Tufan</a:t>
+            </a:r>
+            <a:r>
+              <a:rPr lang="en-US" dirty="0">
+                <a:solidFill>
+                  <a:schemeClr val="bg1"/>
+                </a:solidFill>
+              </a:rPr>
+              <a:t> Acharya</a:t>
+            </a:r>
+          </a:p>
+        </p:txBody>
+      </p:sp>
+      <p:sp>
+        <p:nvSpPr>
+          <p:cNvPr id="3" name="Content Placeholder 2">
+            <a:extLst>
+              <a:ext uri="{FF2B5EF4-FFF2-40B4-BE49-F238E27FC236}">
+                <a16:creationId xmlns:a16="http://schemas.microsoft.com/office/drawing/2014/main" id="{2CFB51F6-02A2-C442-A987-6350B51C63CF}"/>
+              </a:ext>
+            </a:extLst>
+          </p:cNvPr>
+          <p:cNvSpPr>
+            <a:spLocks noGrp="1"/>
+          </p:cNvSpPr>
+          <p:nvPr>
+            <p:ph idx="1"/>
+          </p:nvPr>
+        </p:nvSpPr>
+        <p:spPr/>
+        <p:txBody>
+          <a:bodyPr/>
+          <a:lstStyle/>
+          <a:p>
+            <a:endParaRPr lang="en-US"/>
+          </a:p>
+        </p:txBody>
+      </p:sp>
+    </p:spTree>
+    <p:extLst>
+      <p:ext uri="{BB962C8B-B14F-4D97-AF65-F5344CB8AC3E}">
+        <p14:creationId xmlns:p14="http://schemas.microsoft.com/office/powerpoint/2010/main" val="2670054716"/>
+      </p:ext>
+    </p:extLst>
+  </p:cSld>
+  <p:clrMapOvr>
+    <a:masterClrMapping/>
+  </p:clrMapOvr>
+</p:sld>
+</file>
+
+<file path=ppt/slides/slide14.xml><?xml version="1.0" encoding="utf-8"?>
+<p:sld xmlns:a="http://schemas.openxmlformats.org/drawingml/2006/main" xmlns:r="http://schemas.openxmlformats.org/officeDocument/2006/relationships" xmlns:p="http://schemas.openxmlformats.org/presentationml/2006/main">
+  <p:cSld>
+    <p:spTree>
+      <p:nvGrpSpPr>
+        <p:cNvPr id="1" name=""/>
+        <p:cNvGrpSpPr/>
+        <p:nvPr/>
+      </p:nvGrpSpPr>
+      <p:grpSpPr>
+        <a:xfrm>
+          <a:off x="0" y="0"/>
+          <a:ext cx="0" cy="0"/>
+          <a:chOff x="0" y="0"/>
+          <a:chExt cx="0" cy="0"/>
+        </a:xfrm>
+      </p:grpSpPr>
+      <p:sp>
+        <p:nvSpPr>
+          <p:cNvPr id="2" name="Title 1">
+            <a:extLst>
+              <a:ext uri="{FF2B5EF4-FFF2-40B4-BE49-F238E27FC236}">
+                <a16:creationId xmlns:a16="http://schemas.microsoft.com/office/drawing/2014/main" id="{2C354EBB-46D3-FD47-865F-B3D63E97315A}"/>
+              </a:ext>
+            </a:extLst>
+          </p:cNvPr>
+          <p:cNvSpPr>
+            <a:spLocks noGrp="1"/>
+          </p:cNvSpPr>
+          <p:nvPr>
+            <p:ph type="title"/>
+          </p:nvPr>
+        </p:nvSpPr>
+        <p:spPr/>
+        <p:txBody>
+          <a:bodyPr/>
+          <a:lstStyle/>
+          <a:p>
+            <a:r>
+              <a:rPr lang="en-US" dirty="0">
+                <a:solidFill>
+                  <a:schemeClr val="bg1"/>
+                </a:solidFill>
+              </a:rPr>
+              <a:t>Joshua </a:t>
+            </a:r>
+            <a:r>
+              <a:rPr lang="en-US" dirty="0" err="1">
+                <a:solidFill>
+                  <a:schemeClr val="bg1"/>
+                </a:solidFill>
+              </a:rPr>
+              <a:t>Abuto</a:t>
+            </a:r>
+            <a:endParaRPr lang="en-US" dirty="0"/>
+          </a:p>
+        </p:txBody>
+      </p:sp>
+      <p:sp>
+        <p:nvSpPr>
+          <p:cNvPr id="3" name="Content Placeholder 2">
+            <a:extLst>
+              <a:ext uri="{FF2B5EF4-FFF2-40B4-BE49-F238E27FC236}">
+                <a16:creationId xmlns:a16="http://schemas.microsoft.com/office/drawing/2014/main" id="{0F0A1B0E-D86E-6F43-BAF2-21E6BA0B141C}"/>
+              </a:ext>
+            </a:extLst>
+          </p:cNvPr>
+          <p:cNvSpPr>
+            <a:spLocks noGrp="1"/>
+          </p:cNvSpPr>
+          <p:nvPr>
+            <p:ph idx="1"/>
+          </p:nvPr>
+        </p:nvSpPr>
+        <p:spPr/>
+        <p:txBody>
+          <a:bodyPr/>
+          <a:lstStyle/>
+          <a:p>
+            <a:endParaRPr lang="en-US" dirty="0"/>
+          </a:p>
+        </p:txBody>
+      </p:sp>
+    </p:spTree>
+    <p:extLst>
+      <p:ext uri="{BB962C8B-B14F-4D97-AF65-F5344CB8AC3E}">
+        <p14:creationId xmlns:p14="http://schemas.microsoft.com/office/powerpoint/2010/main" val="947146701"/>
+      </p:ext>
+    </p:extLst>
+  </p:cSld>
+  <p:clrMapOvr>
+    <a:masterClrMapping/>
+  </p:clrMapOvr>
+</p:sld>
+</file>
+
+<file path=ppt/slides/slide15.xml><?xml version="1.0" encoding="utf-8"?>
+<p:sld xmlns:a="http://schemas.openxmlformats.org/drawingml/2006/main" xmlns:r="http://schemas.openxmlformats.org/officeDocument/2006/relationships" xmlns:p="http://schemas.openxmlformats.org/presentationml/2006/main">
+  <p:cSld>
+    <p:spTree>
+      <p:nvGrpSpPr>
+        <p:cNvPr id="1" name=""/>
+        <p:cNvGrpSpPr/>
+        <p:nvPr/>
+      </p:nvGrpSpPr>
+      <p:grpSpPr>
+        <a:xfrm>
+          <a:off x="0" y="0"/>
+          <a:ext cx="0" cy="0"/>
+          <a:chOff x="0" y="0"/>
+          <a:chExt cx="0" cy="0"/>
+        </a:xfrm>
+      </p:grpSpPr>
+      <p:sp>
+        <p:nvSpPr>
+          <p:cNvPr id="2" name="Title 1">
+            <a:extLst>
+              <a:ext uri="{FF2B5EF4-FFF2-40B4-BE49-F238E27FC236}">
+                <a16:creationId xmlns:a16="http://schemas.microsoft.com/office/drawing/2014/main" id="{8B861450-DBD9-A849-8ADE-8F6D67EDB263}"/>
+              </a:ext>
+            </a:extLst>
+          </p:cNvPr>
+          <p:cNvSpPr>
+            <a:spLocks noGrp="1"/>
+          </p:cNvSpPr>
+          <p:nvPr>
+            <p:ph type="title"/>
+          </p:nvPr>
+        </p:nvSpPr>
+        <p:spPr/>
+        <p:txBody>
+          <a:bodyPr/>
+          <a:lstStyle/>
+          <a:p>
+            <a:r>
+              <a:rPr lang="en-US" dirty="0">
+                <a:solidFill>
+                  <a:schemeClr val="bg1"/>
+                </a:solidFill>
+              </a:rPr>
+              <a:t>Program in use</a:t>
+            </a:r>
+            <a:endParaRPr lang="en-US" dirty="0"/>
+          </a:p>
+        </p:txBody>
+      </p:sp>
+      <p:sp>
+        <p:nvSpPr>
+          <p:cNvPr id="3" name="Content Placeholder 2">
+            <a:extLst>
+              <a:ext uri="{FF2B5EF4-FFF2-40B4-BE49-F238E27FC236}">
+                <a16:creationId xmlns:a16="http://schemas.microsoft.com/office/drawing/2014/main" id="{487E7510-DA54-1040-8A55-13E4DD997607}"/>
+              </a:ext>
+            </a:extLst>
+          </p:cNvPr>
+          <p:cNvSpPr>
+            <a:spLocks noGrp="1"/>
+          </p:cNvSpPr>
+          <p:nvPr>
+            <p:ph idx="1"/>
+          </p:nvPr>
+        </p:nvSpPr>
+        <p:spPr/>
+        <p:txBody>
+          <a:bodyPr/>
+          <a:lstStyle/>
+          <a:p>
+            <a:r>
+              <a:rPr lang="en-US" dirty="0">
+                <a:solidFill>
+                  <a:schemeClr val="bg1"/>
+                </a:solidFill>
+              </a:rPr>
+              <a:t>Some screenshots of the program in use</a:t>
+            </a:r>
+          </a:p>
+        </p:txBody>
+      </p:sp>
+    </p:spTree>
+    <p:extLst>
+      <p:ext uri="{BB962C8B-B14F-4D97-AF65-F5344CB8AC3E}">
+        <p14:creationId xmlns:p14="http://schemas.microsoft.com/office/powerpoint/2010/main" val="1356968519"/>
+      </p:ext>
+    </p:extLst>
+  </p:cSld>
+  <p:clrMapOvr>
+    <a:masterClrMapping/>
+  </p:clrMapOvr>
+</p:sld>
+</file>
+
+<file path=ppt/slides/slide16.xml><?xml version="1.0" encoding="utf-8"?>
+<p:sld xmlns:a="http://schemas.openxmlformats.org/drawingml/2006/main" xmlns:r="http://schemas.openxmlformats.org/officeDocument/2006/relationships" xmlns:p="http://schemas.openxmlformats.org/presentationml/2006/main">
+  <p:cSld>
+    <p:spTree>
+      <p:nvGrpSpPr>
+        <p:cNvPr id="1" name=""/>
+        <p:cNvGrpSpPr/>
+        <p:nvPr/>
+      </p:nvGrpSpPr>
+      <p:grpSpPr>
+        <a:xfrm>
+          <a:off x="0" y="0"/>
+          <a:ext cx="0" cy="0"/>
+          <a:chOff x="0" y="0"/>
+          <a:chExt cx="0" cy="0"/>
+        </a:xfrm>
+      </p:grpSpPr>
+      <p:sp>
+        <p:nvSpPr>
+          <p:cNvPr id="2" name="Title 1">
+            <a:extLst>
+              <a:ext uri="{FF2B5EF4-FFF2-40B4-BE49-F238E27FC236}">
+                <a16:creationId xmlns:a16="http://schemas.microsoft.com/office/drawing/2014/main" id="{8B861450-DBD9-A849-8ADE-8F6D67EDB263}"/>
+              </a:ext>
+            </a:extLst>
+          </p:cNvPr>
+          <p:cNvSpPr>
+            <a:spLocks noGrp="1"/>
+          </p:cNvSpPr>
+          <p:nvPr>
+            <p:ph type="title"/>
+          </p:nvPr>
+        </p:nvSpPr>
+        <p:spPr/>
+        <p:txBody>
+          <a:bodyPr/>
+          <a:lstStyle/>
+          <a:p>
+            <a:r>
+              <a:rPr lang="en-US" dirty="0">
+                <a:solidFill>
+                  <a:schemeClr val="bg1"/>
+                </a:solidFill>
+              </a:rPr>
+              <a:t>Program in use</a:t>
+            </a:r>
+            <a:endParaRPr lang="en-US" dirty="0"/>
+          </a:p>
+        </p:txBody>
+      </p:sp>
+      <p:sp>
+        <p:nvSpPr>
+          <p:cNvPr id="3" name="Content Placeholder 2">
+            <a:extLst>
+              <a:ext uri="{FF2B5EF4-FFF2-40B4-BE49-F238E27FC236}">
+                <a16:creationId xmlns:a16="http://schemas.microsoft.com/office/drawing/2014/main" id="{487E7510-DA54-1040-8A55-13E4DD997607}"/>
+              </a:ext>
+            </a:extLst>
+          </p:cNvPr>
+          <p:cNvSpPr>
+            <a:spLocks noGrp="1"/>
+          </p:cNvSpPr>
+          <p:nvPr>
+            <p:ph idx="1"/>
+          </p:nvPr>
+        </p:nvSpPr>
+        <p:spPr/>
+        <p:txBody>
+          <a:bodyPr/>
+          <a:lstStyle/>
+          <a:p>
+            <a:r>
+              <a:rPr lang="en-US" dirty="0">
+                <a:solidFill>
+                  <a:schemeClr val="bg1"/>
+                </a:solidFill>
+              </a:rPr>
+              <a:t>Some screenshots of the program in use</a:t>
+            </a:r>
+          </a:p>
+        </p:txBody>
+      </p:sp>
+    </p:spTree>
+    <p:extLst>
+      <p:ext uri="{BB962C8B-B14F-4D97-AF65-F5344CB8AC3E}">
+        <p14:creationId xmlns:p14="http://schemas.microsoft.com/office/powerpoint/2010/main" val="821152634"/>
+      </p:ext>
+    </p:extLst>
+  </p:cSld>
+  <p:clrMapOvr>
+    <a:masterClrMapping/>
+  </p:clrMapOvr>
+</p:sld>
+</file>
+
 <file path=ppt/slides/slide2.xml><?xml version="1.0" encoding="utf-8"?>
 <p:sld xmlns:a="http://schemas.openxmlformats.org/drawingml/2006/main" xmlns:r="http://schemas.openxmlformats.org/officeDocument/2006/relationships" xmlns:p="http://schemas.openxmlformats.org/presentationml/2006/main">
   <p:cSld>
@@ -13643,7 +13416,9 @@
         </p:nvSpPr>
         <p:spPr/>
         <p:txBody>
-          <a:bodyPr/>
+          <a:bodyPr>
+            <a:normAutofit fontScale="92500" lnSpcReduction="10000"/>
+          </a:bodyPr>
           <a:lstStyle/>
           <a:p>
             <a:r>
@@ -13672,7 +13447,17 @@
                   <a:schemeClr val="bg1"/>
                 </a:solidFill>
               </a:rPr>
-              <a:t>Software development process</a:t>
+              <a:t>Transition from Iteration I to Iteration II</a:t>
+            </a:r>
+          </a:p>
+          <a:p>
+            <a:r>
+              <a:rPr lang="en-US" dirty="0">
+                <a:solidFill>
+                  <a:schemeClr val="bg1"/>
+                </a:solidFill>
+              </a:rPr>
+              <a:t>Difficulties and adaption</a:t>
             </a:r>
           </a:p>
           <a:p>
@@ -13692,7 +13477,7 @@
                   <a:schemeClr val="bg1"/>
                 </a:solidFill>
               </a:rPr>
-              <a:t>Transition from Iteration I to Iteration II</a:t>
+              <a:t>Work Distribution</a:t>
             </a:r>
           </a:p>
           <a:p>
@@ -13704,6 +13489,13 @@
               </a:rPr>
               <a:t>Program in use.</a:t>
             </a:r>
+          </a:p>
+          <a:p>
+            <a:endParaRPr lang="en-US" dirty="0">
+              <a:solidFill>
+                <a:schemeClr val="bg1"/>
+              </a:solidFill>
+            </a:endParaRPr>
           </a:p>
           <a:p>
             <a:endParaRPr lang="en-US" dirty="0">
@@ -15590,7 +15382,7 @@
           <p:cNvPr id="2" name="Title 1">
             <a:extLst>
               <a:ext uri="{FF2B5EF4-FFF2-40B4-BE49-F238E27FC236}">
-                <a16:creationId xmlns:a16="http://schemas.microsoft.com/office/drawing/2014/main" id="{3ED804C7-661D-8D43-BF32-926C42A91E7A}"/>
+                <a16:creationId xmlns:a16="http://schemas.microsoft.com/office/drawing/2014/main" id="{F83B549A-F18B-AD46-BE0E-A41FF2ABBBB8}"/>
               </a:ext>
             </a:extLst>
           </p:cNvPr>
@@ -15612,452 +15404,278 @@
                   <a:schemeClr val="bg1"/>
                 </a:solidFill>
               </a:rPr>
-              <a:t>Software development process</a:t>
+              <a:t>Transition from Iteration I to Iteration II</a:t>
             </a:r>
-          </a:p>
-        </p:txBody>
-      </p:sp>
-      <p:sp>
-        <p:nvSpPr>
-          <p:cNvPr id="3" name="Content Placeholder 2">
+            <a:endParaRPr lang="en-US" dirty="0"/>
+          </a:p>
+        </p:txBody>
+      </p:sp>
+      <p:graphicFrame>
+        <p:nvGraphicFramePr>
+          <p:cNvPr id="4" name="Content Placeholder 3">
             <a:extLst>
               <a:ext uri="{FF2B5EF4-FFF2-40B4-BE49-F238E27FC236}">
-                <a16:creationId xmlns:a16="http://schemas.microsoft.com/office/drawing/2014/main" id="{8285E06F-BE8B-C24C-B48C-30CE9AE8B101}"/>
+                <a16:creationId xmlns:a16="http://schemas.microsoft.com/office/drawing/2014/main" id="{FB999BB1-763C-0849-BEC0-F5FE5163B43D}"/>
               </a:ext>
             </a:extLst>
           </p:cNvPr>
-          <p:cNvSpPr>
-            <a:spLocks noGrp="1"/>
-          </p:cNvSpPr>
+          <p:cNvGraphicFramePr>
+            <a:graphicFrameLocks noGrp="1"/>
+          </p:cNvGraphicFramePr>
           <p:nvPr>
             <p:ph idx="1"/>
+            <p:extLst/>
           </p:nvPr>
-        </p:nvSpPr>
-        <p:spPr/>
-        <p:txBody>
-          <a:bodyPr>
-            <a:normAutofit fontScale="92500" lnSpcReduction="20000"/>
-          </a:bodyPr>
-          <a:lstStyle/>
-          <a:p>
-            <a:r>
-              <a:rPr lang="en-US" dirty="0">
-                <a:solidFill>
-                  <a:schemeClr val="bg1"/>
-                </a:solidFill>
-              </a:rPr>
-              <a:t>Agile development process</a:t>
-            </a:r>
-          </a:p>
-          <a:p>
-            <a:r>
-              <a:rPr lang="en-US" dirty="0">
-                <a:solidFill>
-                  <a:schemeClr val="bg1"/>
-                </a:solidFill>
-              </a:rPr>
-              <a:t>Steps:</a:t>
-            </a:r>
-          </a:p>
-          <a:p>
-            <a:pPr lvl="1"/>
-            <a:r>
-              <a:rPr lang="en-US" dirty="0">
-                <a:solidFill>
-                  <a:schemeClr val="bg1"/>
-                </a:solidFill>
-              </a:rPr>
-              <a:t>Requirements</a:t>
-            </a:r>
-          </a:p>
-          <a:p>
-            <a:pPr lvl="1"/>
-            <a:r>
-              <a:rPr lang="en-US" dirty="0">
-                <a:solidFill>
-                  <a:schemeClr val="bg1"/>
-                </a:solidFill>
-              </a:rPr>
-              <a:t>Design</a:t>
-            </a:r>
-          </a:p>
-          <a:p>
-            <a:pPr lvl="1"/>
-            <a:r>
-              <a:rPr lang="en-US" dirty="0">
-                <a:solidFill>
-                  <a:schemeClr val="bg1"/>
-                </a:solidFill>
-              </a:rPr>
-              <a:t>Development</a:t>
-            </a:r>
-          </a:p>
-          <a:p>
-            <a:pPr lvl="1"/>
-            <a:r>
-              <a:rPr lang="en-US" dirty="0">
-                <a:solidFill>
-                  <a:schemeClr val="bg1"/>
-                </a:solidFill>
-              </a:rPr>
-              <a:t>Testing</a:t>
-            </a:r>
-          </a:p>
-          <a:p>
-            <a:pPr lvl="1"/>
-            <a:r>
-              <a:rPr lang="en-US" dirty="0">
-                <a:solidFill>
-                  <a:schemeClr val="bg1"/>
-                </a:solidFill>
-              </a:rPr>
-              <a:t>Release</a:t>
-            </a:r>
-          </a:p>
-          <a:p>
-            <a:pPr lvl="1"/>
-            <a:r>
-              <a:rPr lang="en-US" dirty="0">
-                <a:solidFill>
-                  <a:schemeClr val="bg1"/>
-                </a:solidFill>
-              </a:rPr>
-              <a:t>Receive Feedback</a:t>
-            </a:r>
-          </a:p>
-          <a:p>
-            <a:pPr lvl="1"/>
-            <a:r>
-              <a:rPr lang="en-US" dirty="0">
-                <a:solidFill>
-                  <a:schemeClr val="bg1"/>
-                </a:solidFill>
-              </a:rPr>
-              <a:t>Add functionality</a:t>
-            </a:r>
-          </a:p>
-        </p:txBody>
-      </p:sp>
-      <p:pic>
-        <p:nvPicPr>
-          <p:cNvPr id="8" name="Picture 7">
+        </p:nvGraphicFramePr>
+        <p:xfrm>
+          <a:off x="1141413" y="2249488"/>
+          <a:ext cx="9905998" cy="1478570"/>
+        </p:xfrm>
+        <a:graphic>
+          <a:graphicData uri="http://schemas.openxmlformats.org/drawingml/2006/table">
+            <a:tbl>
+              <a:tblPr firstRow="1" bandRow="1">
+                <a:tableStyleId>{5C22544A-7EE6-4342-B048-85BDC9FD1C3A}</a:tableStyleId>
+              </a:tblPr>
+              <a:tblGrid>
+                <a:gridCol w="4952999">
+                  <a:extLst>
+                    <a:ext uri="{9D8B030D-6E8A-4147-A177-3AD203B41FA5}">
+                      <a16:colId xmlns:a16="http://schemas.microsoft.com/office/drawing/2014/main" val="2994169306"/>
+                    </a:ext>
+                  </a:extLst>
+                </a:gridCol>
+                <a:gridCol w="4952999">
+                  <a:extLst>
+                    <a:ext uri="{9D8B030D-6E8A-4147-A177-3AD203B41FA5}">
+                      <a16:colId xmlns:a16="http://schemas.microsoft.com/office/drawing/2014/main" val="350041876"/>
+                    </a:ext>
+                  </a:extLst>
+                </a:gridCol>
+              </a:tblGrid>
+              <a:tr h="739285">
+                <a:tc>
+                  <a:txBody>
+                    <a:bodyPr/>
+                    <a:lstStyle/>
+                    <a:p>
+                      <a:r>
+                        <a:rPr lang="en-US" dirty="0">
+                          <a:solidFill>
+                            <a:schemeClr val="bg1"/>
+                          </a:solidFill>
+                        </a:rPr>
+                        <a:t>SLOC Iteration I</a:t>
+                      </a:r>
+                    </a:p>
+                  </a:txBody>
+                  <a:tcPr/>
+                </a:tc>
+                <a:tc>
+                  <a:txBody>
+                    <a:bodyPr/>
+                    <a:lstStyle/>
+                    <a:p>
+                      <a:r>
+                        <a:rPr lang="en-US" dirty="0">
+                          <a:solidFill>
+                            <a:schemeClr val="bg1"/>
+                          </a:solidFill>
+                        </a:rPr>
+                        <a:t>SLOC Iteration II</a:t>
+                      </a:r>
+                    </a:p>
+                  </a:txBody>
+                  <a:tcPr/>
+                </a:tc>
+                <a:extLst>
+                  <a:ext uri="{0D108BD9-81ED-4DB2-BD59-A6C34878D82A}">
+                    <a16:rowId xmlns:a16="http://schemas.microsoft.com/office/drawing/2014/main" val="3711174837"/>
+                  </a:ext>
+                </a:extLst>
+              </a:tr>
+              <a:tr h="739285">
+                <a:tc>
+                  <a:txBody>
+                    <a:bodyPr/>
+                    <a:lstStyle/>
+                    <a:p>
+                      <a:endParaRPr lang="en-US" dirty="0">
+                        <a:solidFill>
+                          <a:schemeClr val="bg1"/>
+                        </a:solidFill>
+                      </a:endParaRPr>
+                    </a:p>
+                  </a:txBody>
+                  <a:tcPr/>
+                </a:tc>
+                <a:tc>
+                  <a:txBody>
+                    <a:bodyPr/>
+                    <a:lstStyle/>
+                    <a:p>
+                      <a:endParaRPr lang="en-US" dirty="0">
+                        <a:solidFill>
+                          <a:schemeClr val="bg1"/>
+                        </a:solidFill>
+                      </a:endParaRPr>
+                    </a:p>
+                  </a:txBody>
+                  <a:tcPr/>
+                </a:tc>
+                <a:extLst>
+                  <a:ext uri="{0D108BD9-81ED-4DB2-BD59-A6C34878D82A}">
+                    <a16:rowId xmlns:a16="http://schemas.microsoft.com/office/drawing/2014/main" val="3264335068"/>
+                  </a:ext>
+                </a:extLst>
+              </a:tr>
+            </a:tbl>
+          </a:graphicData>
+        </a:graphic>
+      </p:graphicFrame>
+      <p:graphicFrame>
+        <p:nvGraphicFramePr>
+          <p:cNvPr id="3" name="Table 2">
             <a:extLst>
               <a:ext uri="{FF2B5EF4-FFF2-40B4-BE49-F238E27FC236}">
-                <a16:creationId xmlns:a16="http://schemas.microsoft.com/office/drawing/2014/main" id="{C73CC7B2-AD58-F946-9E76-8EDE7B4A043A}"/>
+                <a16:creationId xmlns:a16="http://schemas.microsoft.com/office/drawing/2014/main" id="{320EB039-3245-9045-B3D2-FC26166D1C4B}"/>
               </a:ext>
             </a:extLst>
           </p:cNvPr>
-          <p:cNvPicPr>
-            <a:picLocks noChangeAspect="1"/>
-          </p:cNvPicPr>
-          <p:nvPr/>
-        </p:nvPicPr>
-        <p:blipFill>
-          <a:blip r:embed="rId2"/>
-          <a:stretch>
-            <a:fillRect/>
-          </a:stretch>
-        </p:blipFill>
-        <p:spPr>
-          <a:xfrm>
-            <a:off x="3882505" y="2779713"/>
-            <a:ext cx="7429500" cy="3962400"/>
-          </a:xfrm>
-          <a:prstGeom prst="rect">
-            <a:avLst/>
-          </a:prstGeom>
-        </p:spPr>
-      </p:pic>
-      <p:sp>
-        <p:nvSpPr>
-          <p:cNvPr id="9" name="TextBox 8">
-            <a:extLst>
-              <a:ext uri="{FF2B5EF4-FFF2-40B4-BE49-F238E27FC236}">
-                <a16:creationId xmlns:a16="http://schemas.microsoft.com/office/drawing/2014/main" id="{F853B3B7-FF37-6B47-B32C-D2E7D0948F06}"/>
-              </a:ext>
-            </a:extLst>
-          </p:cNvPr>
-          <p:cNvSpPr txBox="1"/>
-          <p:nvPr/>
-        </p:nvSpPr>
-        <p:spPr>
-          <a:xfrm>
-            <a:off x="4708477" y="3224283"/>
-            <a:ext cx="2115836" cy="369332"/>
-          </a:xfrm>
-          <a:prstGeom prst="rect">
-            <a:avLst/>
-          </a:prstGeom>
-          <a:noFill/>
-        </p:spPr>
-        <p:txBody>
-          <a:bodyPr wrap="none" rtlCol="0">
-            <a:spAutoFit/>
-          </a:bodyPr>
-          <a:lstStyle/>
-          <a:p>
-            <a:r>
-              <a:rPr lang="en-US" dirty="0">
-                <a:solidFill>
-                  <a:schemeClr val="bg1"/>
-                </a:solidFill>
-              </a:rPr>
-              <a:t>Requirements/Design</a:t>
-            </a:r>
-          </a:p>
-        </p:txBody>
-      </p:sp>
-      <p:sp>
-        <p:nvSpPr>
-          <p:cNvPr id="10" name="TextBox 9">
-            <a:extLst>
-              <a:ext uri="{FF2B5EF4-FFF2-40B4-BE49-F238E27FC236}">
-                <a16:creationId xmlns:a16="http://schemas.microsoft.com/office/drawing/2014/main" id="{D28BC394-F4AB-604F-AD07-3A0BCF86EBE2}"/>
-              </a:ext>
-            </a:extLst>
-          </p:cNvPr>
-          <p:cNvSpPr txBox="1"/>
-          <p:nvPr/>
-        </p:nvSpPr>
-        <p:spPr>
-          <a:xfrm>
-            <a:off x="7822443" y="3224283"/>
-            <a:ext cx="944682" cy="369332"/>
-          </a:xfrm>
-          <a:prstGeom prst="rect">
-            <a:avLst/>
-          </a:prstGeom>
-          <a:noFill/>
-        </p:spPr>
-        <p:txBody>
-          <a:bodyPr wrap="none" rtlCol="0">
-            <a:spAutoFit/>
-          </a:bodyPr>
-          <a:lstStyle/>
-          <a:p>
-            <a:r>
-              <a:rPr lang="en-US" dirty="0">
-                <a:solidFill>
-                  <a:schemeClr val="bg1"/>
-                </a:solidFill>
-              </a:rPr>
-              <a:t>Develop</a:t>
-            </a:r>
-          </a:p>
-        </p:txBody>
-      </p:sp>
-      <p:sp>
-        <p:nvSpPr>
-          <p:cNvPr id="11" name="TextBox 10">
-            <a:extLst>
-              <a:ext uri="{FF2B5EF4-FFF2-40B4-BE49-F238E27FC236}">
-                <a16:creationId xmlns:a16="http://schemas.microsoft.com/office/drawing/2014/main" id="{C551EF0F-3330-874A-B3BC-7892C306A012}"/>
-              </a:ext>
-            </a:extLst>
-          </p:cNvPr>
-          <p:cNvSpPr txBox="1"/>
-          <p:nvPr/>
-        </p:nvSpPr>
-        <p:spPr>
-          <a:xfrm rot="5400000">
-            <a:off x="9782940" y="4129074"/>
-            <a:ext cx="522066" cy="369332"/>
-          </a:xfrm>
-          <a:prstGeom prst="rect">
-            <a:avLst/>
-          </a:prstGeom>
-          <a:noFill/>
-        </p:spPr>
-        <p:txBody>
-          <a:bodyPr wrap="none" rtlCol="0">
-            <a:spAutoFit/>
-          </a:bodyPr>
-          <a:lstStyle/>
-          <a:p>
-            <a:r>
-              <a:rPr lang="en-US" dirty="0">
-                <a:solidFill>
-                  <a:schemeClr val="bg1"/>
-                </a:solidFill>
-              </a:rPr>
-              <a:t>Test</a:t>
-            </a:r>
-          </a:p>
-        </p:txBody>
-      </p:sp>
-      <p:sp>
-        <p:nvSpPr>
-          <p:cNvPr id="12" name="TextBox 11">
-            <a:extLst>
-              <a:ext uri="{FF2B5EF4-FFF2-40B4-BE49-F238E27FC236}">
-                <a16:creationId xmlns:a16="http://schemas.microsoft.com/office/drawing/2014/main" id="{51CDB4BF-973E-6743-913D-A7207927A639}"/>
-              </a:ext>
-            </a:extLst>
-          </p:cNvPr>
-          <p:cNvSpPr txBox="1"/>
-          <p:nvPr/>
-        </p:nvSpPr>
-        <p:spPr>
-          <a:xfrm>
-            <a:off x="7974843" y="5287369"/>
-            <a:ext cx="894347" cy="369332"/>
-          </a:xfrm>
-          <a:prstGeom prst="rect">
-            <a:avLst/>
-          </a:prstGeom>
-          <a:noFill/>
-        </p:spPr>
-        <p:txBody>
-          <a:bodyPr wrap="none" rtlCol="0">
-            <a:spAutoFit/>
-          </a:bodyPr>
-          <a:lstStyle/>
-          <a:p>
-            <a:r>
-              <a:rPr lang="en-US" dirty="0">
-                <a:solidFill>
-                  <a:schemeClr val="bg1"/>
-                </a:solidFill>
-              </a:rPr>
-              <a:t>Release</a:t>
-            </a:r>
-          </a:p>
-        </p:txBody>
-      </p:sp>
-      <p:sp>
-        <p:nvSpPr>
-          <p:cNvPr id="13" name="TextBox 12">
-            <a:extLst>
-              <a:ext uri="{FF2B5EF4-FFF2-40B4-BE49-F238E27FC236}">
-                <a16:creationId xmlns:a16="http://schemas.microsoft.com/office/drawing/2014/main" id="{43488E90-3C31-7A40-8140-1174402C5534}"/>
-              </a:ext>
-            </a:extLst>
-          </p:cNvPr>
-          <p:cNvSpPr txBox="1"/>
-          <p:nvPr/>
-        </p:nvSpPr>
-        <p:spPr>
-          <a:xfrm rot="16200000">
-            <a:off x="6321819" y="4741161"/>
-            <a:ext cx="1092415" cy="369332"/>
-          </a:xfrm>
-          <a:prstGeom prst="rect">
-            <a:avLst/>
-          </a:prstGeom>
-          <a:noFill/>
-        </p:spPr>
-        <p:txBody>
-          <a:bodyPr wrap="none" rtlCol="0">
-            <a:spAutoFit/>
-          </a:bodyPr>
-          <a:lstStyle/>
-          <a:p>
-            <a:r>
-              <a:rPr lang="en-US" dirty="0">
-                <a:solidFill>
-                  <a:schemeClr val="bg1"/>
-                </a:solidFill>
-              </a:rPr>
-              <a:t>Feedback</a:t>
-            </a:r>
-          </a:p>
-        </p:txBody>
-      </p:sp>
-      <p:sp>
-        <p:nvSpPr>
-          <p:cNvPr id="14" name="Right Arrow 13">
-            <a:extLst>
-              <a:ext uri="{FF2B5EF4-FFF2-40B4-BE49-F238E27FC236}">
-                <a16:creationId xmlns:a16="http://schemas.microsoft.com/office/drawing/2014/main" id="{E7A6F530-F007-944B-B7D2-5DA80FAA0104}"/>
-              </a:ext>
-            </a:extLst>
-          </p:cNvPr>
-          <p:cNvSpPr/>
-          <p:nvPr/>
-        </p:nvSpPr>
-        <p:spPr>
-          <a:xfrm rot="11880308">
-            <a:off x="4432861" y="3843104"/>
-            <a:ext cx="1884809" cy="708206"/>
-          </a:xfrm>
-          <a:prstGeom prst="rightArrow">
-            <a:avLst/>
-          </a:prstGeom>
-          <a:noFill/>
-          <a:ln w="25400">
-            <a:solidFill>
-              <a:schemeClr val="bg1"/>
-            </a:solidFill>
-          </a:ln>
-        </p:spPr>
-        <p:style>
-          <a:lnRef idx="2">
-            <a:schemeClr val="accent1">
-              <a:shade val="50000"/>
-            </a:schemeClr>
-          </a:lnRef>
-          <a:fillRef idx="1">
-            <a:schemeClr val="accent1"/>
-          </a:fillRef>
-          <a:effectRef idx="0">
-            <a:schemeClr val="accent1"/>
-          </a:effectRef>
-          <a:fontRef idx="minor">
-            <a:schemeClr val="lt1"/>
-          </a:fontRef>
-        </p:style>
-        <p:txBody>
-          <a:bodyPr rtlCol="0" anchor="ctr"/>
-          <a:lstStyle/>
-          <a:p>
-            <a:pPr algn="ctr"/>
-            <a:endParaRPr lang="en-US"/>
-          </a:p>
-        </p:txBody>
-      </p:sp>
-      <p:sp>
-        <p:nvSpPr>
-          <p:cNvPr id="15" name="TextBox 14">
-            <a:extLst>
-              <a:ext uri="{FF2B5EF4-FFF2-40B4-BE49-F238E27FC236}">
-                <a16:creationId xmlns:a16="http://schemas.microsoft.com/office/drawing/2014/main" id="{E11473FD-936A-8B4A-BE75-1131B020BD71}"/>
-              </a:ext>
-            </a:extLst>
-          </p:cNvPr>
-          <p:cNvSpPr txBox="1"/>
-          <p:nvPr/>
-        </p:nvSpPr>
-        <p:spPr>
-          <a:xfrm rot="1147850">
-            <a:off x="4945804" y="4085054"/>
-            <a:ext cx="1449949" cy="369332"/>
-          </a:xfrm>
-          <a:prstGeom prst="rect">
-            <a:avLst/>
-          </a:prstGeom>
-          <a:noFill/>
-        </p:spPr>
-        <p:txBody>
-          <a:bodyPr wrap="none" rtlCol="0">
-            <a:spAutoFit/>
-          </a:bodyPr>
-          <a:lstStyle/>
-          <a:p>
-            <a:r>
-              <a:rPr lang="en-US" dirty="0">
-                <a:solidFill>
-                  <a:schemeClr val="bg1"/>
-                </a:solidFill>
-              </a:rPr>
-              <a:t>Next Iteration</a:t>
-            </a:r>
-          </a:p>
-        </p:txBody>
-      </p:sp>
+          <p:cNvGraphicFramePr>
+            <a:graphicFrameLocks noGrp="1"/>
+          </p:cNvGraphicFramePr>
+          <p:nvPr>
+            <p:extLst/>
+          </p:nvPr>
+        </p:nvGraphicFramePr>
+        <p:xfrm>
+          <a:off x="1143001" y="4267200"/>
+          <a:ext cx="9904410" cy="1315180"/>
+        </p:xfrm>
+        <a:graphic>
+          <a:graphicData uri="http://schemas.openxmlformats.org/drawingml/2006/table">
+            <a:tbl>
+              <a:tblPr firstRow="1" bandRow="1">
+                <a:tableStyleId>{5C22544A-7EE6-4342-B048-85BDC9FD1C3A}</a:tableStyleId>
+              </a:tblPr>
+              <a:tblGrid>
+                <a:gridCol w="4952205">
+                  <a:extLst>
+                    <a:ext uri="{9D8B030D-6E8A-4147-A177-3AD203B41FA5}">
+                      <a16:colId xmlns:a16="http://schemas.microsoft.com/office/drawing/2014/main" val="3697722470"/>
+                    </a:ext>
+                  </a:extLst>
+                </a:gridCol>
+                <a:gridCol w="4952205">
+                  <a:extLst>
+                    <a:ext uri="{9D8B030D-6E8A-4147-A177-3AD203B41FA5}">
+                      <a16:colId xmlns:a16="http://schemas.microsoft.com/office/drawing/2014/main" val="353497984"/>
+                    </a:ext>
+                  </a:extLst>
+                </a:gridCol>
+              </a:tblGrid>
+              <a:tr h="657590">
+                <a:tc>
+                  <a:txBody>
+                    <a:bodyPr/>
+                    <a:lstStyle/>
+                    <a:p>
+                      <a:r>
+                        <a:rPr lang="en-US" dirty="0">
+                          <a:solidFill>
+                            <a:schemeClr val="bg1"/>
+                          </a:solidFill>
+                        </a:rPr>
+                        <a:t>No. of requirements in Iteration I</a:t>
+                      </a:r>
+                    </a:p>
+                  </a:txBody>
+                  <a:tcPr/>
+                </a:tc>
+                <a:tc>
+                  <a:txBody>
+                    <a:bodyPr/>
+                    <a:lstStyle/>
+                    <a:p>
+                      <a:pPr marL="0" marR="0" lvl="0" indent="0" algn="l" defTabSz="914400" rtl="0" eaLnBrk="1" fontAlgn="auto" latinLnBrk="0" hangingPunct="1">
+                        <a:lnSpc>
+                          <a:spcPct val="100000"/>
+                        </a:lnSpc>
+                        <a:spcBef>
+                          <a:spcPts val="0"/>
+                        </a:spcBef>
+                        <a:spcAft>
+                          <a:spcPts val="0"/>
+                        </a:spcAft>
+                        <a:buClrTx/>
+                        <a:buSzTx/>
+                        <a:buFontTx/>
+                        <a:buNone/>
+                        <a:tabLst/>
+                        <a:defRPr/>
+                      </a:pPr>
+                      <a:r>
+                        <a:rPr lang="en-US" dirty="0">
+                          <a:solidFill>
+                            <a:schemeClr val="bg1"/>
+                          </a:solidFill>
+                        </a:rPr>
+                        <a:t>No. of requirements in Iteration II</a:t>
+                      </a:r>
+                    </a:p>
+                  </a:txBody>
+                  <a:tcPr/>
+                </a:tc>
+                <a:extLst>
+                  <a:ext uri="{0D108BD9-81ED-4DB2-BD59-A6C34878D82A}">
+                    <a16:rowId xmlns:a16="http://schemas.microsoft.com/office/drawing/2014/main" val="3955169420"/>
+                  </a:ext>
+                </a:extLst>
+              </a:tr>
+              <a:tr h="657590">
+                <a:tc>
+                  <a:txBody>
+                    <a:bodyPr/>
+                    <a:lstStyle/>
+                    <a:p>
+                      <a:endParaRPr lang="en-US">
+                        <a:solidFill>
+                          <a:schemeClr val="bg1"/>
+                        </a:solidFill>
+                      </a:endParaRPr>
+                    </a:p>
+                  </a:txBody>
+                  <a:tcPr/>
+                </a:tc>
+                <a:tc>
+                  <a:txBody>
+                    <a:bodyPr/>
+                    <a:lstStyle/>
+                    <a:p>
+                      <a:endParaRPr lang="en-US" dirty="0">
+                        <a:solidFill>
+                          <a:schemeClr val="bg1"/>
+                        </a:solidFill>
+                      </a:endParaRPr>
+                    </a:p>
+                  </a:txBody>
+                  <a:tcPr/>
+                </a:tc>
+                <a:extLst>
+                  <a:ext uri="{0D108BD9-81ED-4DB2-BD59-A6C34878D82A}">
+                    <a16:rowId xmlns:a16="http://schemas.microsoft.com/office/drawing/2014/main" val="134725175"/>
+                  </a:ext>
+                </a:extLst>
+              </a:tr>
+            </a:tbl>
+          </a:graphicData>
+        </a:graphic>
+      </p:graphicFrame>
     </p:spTree>
     <p:extLst>
       <p:ext uri="{BB962C8B-B14F-4D97-AF65-F5344CB8AC3E}">
-        <p14:creationId xmlns:p14="http://schemas.microsoft.com/office/powerpoint/2010/main" val="1633062947"/>
+        <p14:creationId xmlns:p14="http://schemas.microsoft.com/office/powerpoint/2010/main" val="2852872110"/>
       </p:ext>
     </p:extLst>
   </p:cSld>
@@ -16089,7 +15707,7 @@
           <p:cNvPr id="2" name="Title 1">
             <a:extLst>
               <a:ext uri="{FF2B5EF4-FFF2-40B4-BE49-F238E27FC236}">
-                <a16:creationId xmlns:a16="http://schemas.microsoft.com/office/drawing/2014/main" id="{2DBF7481-C423-8F43-B4D7-AFC22E5949EF}"/>
+                <a16:creationId xmlns:a16="http://schemas.microsoft.com/office/drawing/2014/main" id="{A98FB049-D01D-A548-B1C7-BA45997FFC0C}"/>
               </a:ext>
             </a:extLst>
           </p:cNvPr>
@@ -16111,7 +15729,7 @@
                   <a:schemeClr val="bg1"/>
                 </a:solidFill>
               </a:rPr>
-              <a:t>How the program Works</a:t>
+              <a:t>Difficulties With the project</a:t>
             </a:r>
           </a:p>
         </p:txBody>
@@ -16121,7 +15739,7 @@
           <p:cNvPr id="3" name="Content Placeholder 2">
             <a:extLst>
               <a:ext uri="{FF2B5EF4-FFF2-40B4-BE49-F238E27FC236}">
-                <a16:creationId xmlns:a16="http://schemas.microsoft.com/office/drawing/2014/main" id="{FD8DE341-D41C-D040-AAEC-54198B127A94}"/>
+                <a16:creationId xmlns:a16="http://schemas.microsoft.com/office/drawing/2014/main" id="{B58B9350-8EE3-8B4F-BA3F-2620B7CBB98F}"/>
               </a:ext>
             </a:extLst>
           </p:cNvPr>
@@ -16137,9 +15755,29 @@
           <a:bodyPr/>
           <a:lstStyle/>
           <a:p>
+            <a:pPr marL="0" indent="0">
+              <a:buNone/>
+            </a:pPr>
             <a:r>
-              <a:rPr lang="en-US" dirty="0"/>
-              <a:t>TODO</a:t>
+              <a:rPr lang="en-US" dirty="0">
+                <a:solidFill>
+                  <a:schemeClr val="bg1"/>
+                </a:solidFill>
+              </a:rPr>
+              <a:t>-First group programming project for some group members.</a:t>
+            </a:r>
+          </a:p>
+          <a:p>
+            <a:pPr marL="0" indent="0">
+              <a:buNone/>
+            </a:pPr>
+            <a:r>
+              <a:rPr lang="en-US" dirty="0">
+                <a:solidFill>
+                  <a:schemeClr val="bg1"/>
+                </a:solidFill>
+              </a:rPr>
+              <a:t>-Open splice was hard to understand.</a:t>
             </a:r>
           </a:p>
         </p:txBody>
@@ -16147,7 +15785,7 @@
     </p:spTree>
     <p:extLst>
       <p:ext uri="{BB962C8B-B14F-4D97-AF65-F5344CB8AC3E}">
-        <p14:creationId xmlns:p14="http://schemas.microsoft.com/office/powerpoint/2010/main" val="690463302"/>
+        <p14:creationId xmlns:p14="http://schemas.microsoft.com/office/powerpoint/2010/main" val="1002721285"/>
       </p:ext>
     </p:extLst>
   </p:cSld>
@@ -16179,7 +15817,7 @@
           <p:cNvPr id="2" name="Title 1">
             <a:extLst>
               <a:ext uri="{FF2B5EF4-FFF2-40B4-BE49-F238E27FC236}">
-                <a16:creationId xmlns:a16="http://schemas.microsoft.com/office/drawing/2014/main" id="{F83B549A-F18B-AD46-BE0E-A41FF2ABBBB8}"/>
+                <a16:creationId xmlns:a16="http://schemas.microsoft.com/office/drawing/2014/main" id="{B33C0BFD-ECB5-244C-94A5-FD683D59F311}"/>
               </a:ext>
             </a:extLst>
           </p:cNvPr>
@@ -16201,18 +15839,17 @@
                   <a:schemeClr val="bg1"/>
                 </a:solidFill>
               </a:rPr>
-              <a:t>Transition from Iteration I to Iteration II</a:t>
+              <a:t>How did we adapt the difficulties</a:t>
             </a:r>
-            <a:endParaRPr lang="en-US" dirty="0"/>
-          </a:p>
-        </p:txBody>
-      </p:sp>
-      <p:sp>
-        <p:nvSpPr>
-          <p:cNvPr id="9" name="Content Placeholder 8">
+          </a:p>
+        </p:txBody>
+      </p:sp>
+      <p:sp>
+        <p:nvSpPr>
+          <p:cNvPr id="3" name="Content Placeholder 2">
             <a:extLst>
               <a:ext uri="{FF2B5EF4-FFF2-40B4-BE49-F238E27FC236}">
-                <a16:creationId xmlns:a16="http://schemas.microsoft.com/office/drawing/2014/main" id="{D7DC6BCF-3E08-2242-9F5B-16FD37AFEC2A}"/>
+                <a16:creationId xmlns:a16="http://schemas.microsoft.com/office/drawing/2014/main" id="{A99CB0F5-534E-5B44-A05E-69789C59F3B9}"/>
               </a:ext>
             </a:extLst>
           </p:cNvPr>
@@ -16234,7 +15871,7 @@
                   <a:schemeClr val="bg1"/>
                 </a:solidFill>
               </a:rPr>
-              <a:t>Mostly resolved the issues from Iteration I.</a:t>
+              <a:t>Doing online research</a:t>
             </a:r>
           </a:p>
           <a:p>
@@ -16244,37 +15881,22 @@
                   <a:schemeClr val="bg1"/>
                 </a:solidFill>
               </a:rPr>
-              <a:t>Functionality addition</a:t>
+              <a:t>Help from instructor</a:t>
             </a:r>
           </a:p>
           <a:p>
-            <a:pPr lvl="1"/>
-            <a:r>
-              <a:rPr lang="en-US" dirty="0">
-                <a:solidFill>
-                  <a:schemeClr val="bg1"/>
-                </a:solidFill>
-              </a:rPr>
-              <a:t>Send direct message to another user</a:t>
-            </a:r>
-          </a:p>
-          <a:p>
-            <a:pPr lvl="1"/>
-            <a:r>
-              <a:rPr lang="en-US" dirty="0">
-                <a:solidFill>
-                  <a:schemeClr val="bg1"/>
-                </a:solidFill>
-              </a:rPr>
-              <a:t>Notification when new user is online</a:t>
-            </a:r>
+            <a:endParaRPr lang="en-US" dirty="0">
+              <a:solidFill>
+                <a:schemeClr val="bg1"/>
+              </a:solidFill>
+            </a:endParaRPr>
           </a:p>
         </p:txBody>
       </p:sp>
     </p:spTree>
     <p:extLst>
       <p:ext uri="{BB962C8B-B14F-4D97-AF65-F5344CB8AC3E}">
-        <p14:creationId xmlns:p14="http://schemas.microsoft.com/office/powerpoint/2010/main" val="1011719058"/>
+        <p14:creationId xmlns:p14="http://schemas.microsoft.com/office/powerpoint/2010/main" val="4060102586"/>
       </p:ext>
     </p:extLst>
   </p:cSld>
@@ -16306,7 +15928,7 @@
           <p:cNvPr id="2" name="Title 1">
             <a:extLst>
               <a:ext uri="{FF2B5EF4-FFF2-40B4-BE49-F238E27FC236}">
-                <a16:creationId xmlns:a16="http://schemas.microsoft.com/office/drawing/2014/main" id="{F83B549A-F18B-AD46-BE0E-A41FF2ABBBB8}"/>
+                <a16:creationId xmlns:a16="http://schemas.microsoft.com/office/drawing/2014/main" id="{AF4D9851-B95B-6848-B81A-304F26F457CB}"/>
               </a:ext>
             </a:extLst>
           </p:cNvPr>
@@ -16328,149 +15950,89 @@
                   <a:schemeClr val="bg1"/>
                 </a:solidFill>
               </a:rPr>
-              <a:t>Transition from Iteration I to Iteration II</a:t>
+              <a:t>Work Distribution</a:t>
             </a:r>
-            <a:endParaRPr lang="en-US" dirty="0"/>
-          </a:p>
-        </p:txBody>
-      </p:sp>
-      <p:graphicFrame>
-        <p:nvGraphicFramePr>
-          <p:cNvPr id="4" name="Content Placeholder 3">
+          </a:p>
+        </p:txBody>
+      </p:sp>
+      <p:sp>
+        <p:nvSpPr>
+          <p:cNvPr id="3" name="Content Placeholder 2">
             <a:extLst>
               <a:ext uri="{FF2B5EF4-FFF2-40B4-BE49-F238E27FC236}">
-                <a16:creationId xmlns:a16="http://schemas.microsoft.com/office/drawing/2014/main" id="{FB999BB1-763C-0849-BEC0-F5FE5163B43D}"/>
+                <a16:creationId xmlns:a16="http://schemas.microsoft.com/office/drawing/2014/main" id="{287AB180-E2B1-7D4E-8886-60B133E37596}"/>
               </a:ext>
             </a:extLst>
           </p:cNvPr>
-          <p:cNvGraphicFramePr>
-            <a:graphicFrameLocks noGrp="1"/>
-          </p:cNvGraphicFramePr>
+          <p:cNvSpPr>
+            <a:spLocks noGrp="1"/>
+          </p:cNvSpPr>
           <p:nvPr>
             <p:ph idx="1"/>
-            <p:extLst/>
           </p:nvPr>
-        </p:nvGraphicFramePr>
-        <p:xfrm>
-          <a:off x="1141413" y="2249488"/>
-          <a:ext cx="9906000" cy="741680"/>
-        </p:xfrm>
-        <a:graphic>
-          <a:graphicData uri="http://schemas.openxmlformats.org/drawingml/2006/table">
-            <a:tbl>
-              <a:tblPr firstRow="1" bandRow="1">
-                <a:tableStyleId>{5C22544A-7EE6-4342-B048-85BDC9FD1C3A}</a:tableStyleId>
-              </a:tblPr>
-              <a:tblGrid>
-                <a:gridCol w="4953000">
-                  <a:extLst>
-                    <a:ext uri="{9D8B030D-6E8A-4147-A177-3AD203B41FA5}">
-                      <a16:colId xmlns:a16="http://schemas.microsoft.com/office/drawing/2014/main" val="2994169306"/>
-                    </a:ext>
-                  </a:extLst>
-                </a:gridCol>
-                <a:gridCol w="4953000">
-                  <a:extLst>
-                    <a:ext uri="{9D8B030D-6E8A-4147-A177-3AD203B41FA5}">
-                      <a16:colId xmlns:a16="http://schemas.microsoft.com/office/drawing/2014/main" val="350041876"/>
-                    </a:ext>
-                  </a:extLst>
-                </a:gridCol>
-              </a:tblGrid>
-              <a:tr h="370840">
-                <a:tc>
-                  <a:txBody>
-                    <a:bodyPr/>
-                    <a:lstStyle/>
-                    <a:p>
-                      <a:r>
-                        <a:rPr lang="en-US" dirty="0"/>
-                        <a:t>SLOC Iteration I</a:t>
-                      </a:r>
-                    </a:p>
-                  </a:txBody>
-                  <a:tcPr/>
-                </a:tc>
-                <a:tc>
-                  <a:txBody>
-                    <a:bodyPr/>
-                    <a:lstStyle/>
-                    <a:p>
-                      <a:r>
-                        <a:rPr lang="en-US" dirty="0"/>
-                        <a:t>SLOC Iteration II</a:t>
-                      </a:r>
-                    </a:p>
-                  </a:txBody>
-                  <a:tcPr/>
-                </a:tc>
-                <a:extLst>
-                  <a:ext uri="{0D108BD9-81ED-4DB2-BD59-A6C34878D82A}">
-                    <a16:rowId xmlns:a16="http://schemas.microsoft.com/office/drawing/2014/main" val="3711174837"/>
-                  </a:ext>
-                </a:extLst>
-              </a:tr>
-              <a:tr h="370840">
-                <a:tc>
-                  <a:txBody>
-                    <a:bodyPr/>
-                    <a:lstStyle/>
-                    <a:p>
-                      <a:endParaRPr lang="en-US" dirty="0"/>
-                    </a:p>
-                  </a:txBody>
-                  <a:tcPr/>
-                </a:tc>
-                <a:tc>
-                  <a:txBody>
-                    <a:bodyPr/>
-                    <a:lstStyle/>
-                    <a:p>
-                      <a:endParaRPr lang="en-US" dirty="0"/>
-                    </a:p>
-                  </a:txBody>
-                  <a:tcPr/>
-                </a:tc>
-                <a:extLst>
-                  <a:ext uri="{0D108BD9-81ED-4DB2-BD59-A6C34878D82A}">
-                    <a16:rowId xmlns:a16="http://schemas.microsoft.com/office/drawing/2014/main" val="3264335068"/>
-                  </a:ext>
-                </a:extLst>
-              </a:tr>
-            </a:tbl>
-          </a:graphicData>
-        </a:graphic>
-      </p:graphicFrame>
-      <p:graphicFrame>
-        <p:nvGraphicFramePr>
-          <p:cNvPr id="5" name="Chart 4">
-            <a:extLst>
-              <a:ext uri="{FF2B5EF4-FFF2-40B4-BE49-F238E27FC236}">
-                <a16:creationId xmlns:a16="http://schemas.microsoft.com/office/drawing/2014/main" id="{556DF69B-BD6D-AE4E-AF36-54C0E4221C5C}"/>
-              </a:ext>
-            </a:extLst>
-          </p:cNvPr>
-          <p:cNvGraphicFramePr>
-            <a:graphicFrameLocks/>
-          </p:cNvGraphicFramePr>
-          <p:nvPr>
-            <p:extLst/>
-          </p:nvPr>
-        </p:nvGraphicFramePr>
-        <p:xfrm>
-          <a:off x="1421642" y="3429000"/>
-          <a:ext cx="4572000" cy="2743200"/>
-        </p:xfrm>
-        <a:graphic>
-          <a:graphicData uri="http://schemas.openxmlformats.org/drawingml/2006/chart">
-            <c:chart xmlns:c="http://schemas.openxmlformats.org/drawingml/2006/chart" xmlns:r="http://schemas.openxmlformats.org/officeDocument/2006/relationships" r:id="rId2"/>
-          </a:graphicData>
-        </a:graphic>
-      </p:graphicFrame>
+        </p:nvSpPr>
+        <p:spPr/>
+        <p:txBody>
+          <a:bodyPr/>
+          <a:lstStyle/>
+          <a:p>
+            <a:pPr marL="0" indent="0">
+              <a:buNone/>
+            </a:pPr>
+            <a:r>
+              <a:rPr lang="en-US" dirty="0">
+                <a:solidFill>
+                  <a:schemeClr val="bg1"/>
+                </a:solidFill>
+              </a:rPr>
+              <a:t>Design-</a:t>
+            </a:r>
+          </a:p>
+          <a:p>
+            <a:pPr marL="0" indent="0">
+              <a:buNone/>
+            </a:pPr>
+            <a:r>
+              <a:rPr lang="en-US" dirty="0">
+                <a:solidFill>
+                  <a:schemeClr val="bg1"/>
+                </a:solidFill>
+              </a:rPr>
+              <a:t>Documentation- </a:t>
+            </a:r>
+          </a:p>
+          <a:p>
+            <a:pPr marL="0" indent="0">
+              <a:buNone/>
+            </a:pPr>
+            <a:r>
+              <a:rPr lang="en-US" dirty="0">
+                <a:solidFill>
+                  <a:schemeClr val="bg1"/>
+                </a:solidFill>
+              </a:rPr>
+              <a:t>Development-</a:t>
+            </a:r>
+          </a:p>
+          <a:p>
+            <a:pPr marL="0" indent="0">
+              <a:buNone/>
+            </a:pPr>
+            <a:r>
+              <a:rPr lang="en-US" dirty="0">
+                <a:solidFill>
+                  <a:schemeClr val="bg1"/>
+                </a:solidFill>
+              </a:rPr>
+              <a:t>Testing-</a:t>
+            </a:r>
+          </a:p>
+        </p:txBody>
+      </p:sp>
     </p:spTree>
     <p:extLst>
       <p:ext uri="{BB962C8B-B14F-4D97-AF65-F5344CB8AC3E}">
-        <p14:creationId xmlns:p14="http://schemas.microsoft.com/office/powerpoint/2010/main" val="198489916"/>
+        <p14:creationId xmlns:p14="http://schemas.microsoft.com/office/powerpoint/2010/main" val="311762947"/>
       </p:ext>
     </p:extLst>
   </p:cSld>
@@ -16502,7 +16064,7 @@
           <p:cNvPr id="2" name="Title 1">
             <a:extLst>
               <a:ext uri="{FF2B5EF4-FFF2-40B4-BE49-F238E27FC236}">
-                <a16:creationId xmlns:a16="http://schemas.microsoft.com/office/drawing/2014/main" id="{8B861450-DBD9-A849-8ADE-8F6D67EDB263}"/>
+                <a16:creationId xmlns:a16="http://schemas.microsoft.com/office/drawing/2014/main" id="{84855BB8-382A-9E42-9536-913D2C3629A1}"/>
               </a:ext>
             </a:extLst>
           </p:cNvPr>
@@ -16513,51 +16075,25 @@
             <p:ph type="title"/>
           </p:nvPr>
         </p:nvSpPr>
-        <p:spPr/>
-        <p:txBody>
-          <a:bodyPr/>
+        <p:spPr>
+          <a:xfrm>
+            <a:off x="1141412" y="618518"/>
+            <a:ext cx="10780293" cy="6023822"/>
+          </a:xfrm>
+        </p:spPr>
+        <p:txBody>
+          <a:bodyPr>
+            <a:normAutofit/>
+          </a:bodyPr>
           <a:lstStyle/>
           <a:p>
             <a:r>
-              <a:rPr lang="en-US" dirty="0">
+              <a:rPr lang="en-US" sz="8000" dirty="0">
                 <a:solidFill>
                   <a:schemeClr val="bg1"/>
                 </a:solidFill>
               </a:rPr>
-              <a:t>Program in use</a:t>
-            </a:r>
-            <a:endParaRPr lang="en-US" dirty="0"/>
-          </a:p>
-        </p:txBody>
-      </p:sp>
-      <p:sp>
-        <p:nvSpPr>
-          <p:cNvPr id="3" name="Content Placeholder 2">
-            <a:extLst>
-              <a:ext uri="{FF2B5EF4-FFF2-40B4-BE49-F238E27FC236}">
-                <a16:creationId xmlns:a16="http://schemas.microsoft.com/office/drawing/2014/main" id="{487E7510-DA54-1040-8A55-13E4DD997607}"/>
-              </a:ext>
-            </a:extLst>
-          </p:cNvPr>
-          <p:cNvSpPr>
-            <a:spLocks noGrp="1"/>
-          </p:cNvSpPr>
-          <p:nvPr>
-            <p:ph idx="1"/>
-          </p:nvPr>
-        </p:nvSpPr>
-        <p:spPr/>
-        <p:txBody>
-          <a:bodyPr/>
-          <a:lstStyle/>
-          <a:p>
-            <a:r>
-              <a:rPr lang="en-US" dirty="0">
-                <a:solidFill>
-                  <a:schemeClr val="bg1"/>
-                </a:solidFill>
-              </a:rPr>
-              <a:t>Some screenshots of the program in use</a:t>
+              <a:t>Individual Comments</a:t>
             </a:r>
           </a:p>
         </p:txBody>
@@ -16565,7 +16101,7 @@
     </p:spTree>
     <p:extLst>
       <p:ext uri="{BB962C8B-B14F-4D97-AF65-F5344CB8AC3E}">
-        <p14:creationId xmlns:p14="http://schemas.microsoft.com/office/powerpoint/2010/main" val="1356968519"/>
+        <p14:creationId xmlns:p14="http://schemas.microsoft.com/office/powerpoint/2010/main" val="1340941675"/>
       </p:ext>
     </p:extLst>
   </p:cSld>

</xml_diff>